<commit_message>
[PPT] Updated existing architecture diagram pptx slides accordingly
</commit_message>
<xml_diff>
--- a/docs/diagrams/ModelComponentClassDiagram.pptx
+++ b/docs/diagrams/ModelComponentClassDiagram.pptx
@@ -126,6 +126,10 @@
 </p:presentation>
 </file>
 
+<file path=ppt/revisionInfo.xml><?xml version="1.0" encoding="utf-8"?>
+<p1510:revInfo xmlns:a="http://schemas.openxmlformats.org/drawingml/2006/main" xmlns:r="http://schemas.openxmlformats.org/officeDocument/2006/relationships" xmlns:p1510="http://schemas.microsoft.com/office/powerpoint/2015/10/main"/>
+</file>
+
 <file path=ppt/notesMasters/notesMaster1.xml><?xml version="1.0" encoding="utf-8"?>
 <p:notesMaster xmlns:a="http://schemas.openxmlformats.org/drawingml/2006/main" xmlns:r="http://schemas.openxmlformats.org/officeDocument/2006/relationships" xmlns:p="http://schemas.openxmlformats.org/presentationml/2006/main">
   <p:cSld>
@@ -208,7 +212,7 @@
           <a:p>
             <a:fld id="{F5CC4B3F-88C1-4FFA-B1B6-F41C21DC6924}" type="datetimeFigureOut">
               <a:rPr lang="en-US" smtClean="0"/>
-              <a:t>9/4/17</a:t>
+              <a:t>11/13/2017</a:t>
             </a:fld>
             <a:endParaRPr lang="en-US"/>
           </a:p>
@@ -272,38 +276,37 @@
           <a:p>
             <a:pPr lvl="0"/>
             <a:r>
-              <a:rPr lang="en-US" smtClean="0"/>
+              <a:rPr lang="en-US"/>
               <a:t>Click to edit Master text styles</a:t>
             </a:r>
           </a:p>
           <a:p>
             <a:pPr lvl="1"/>
             <a:r>
-              <a:rPr lang="en-US" smtClean="0"/>
+              <a:rPr lang="en-US"/>
               <a:t>Second level</a:t>
             </a:r>
           </a:p>
           <a:p>
             <a:pPr lvl="2"/>
             <a:r>
-              <a:rPr lang="en-US" smtClean="0"/>
+              <a:rPr lang="en-US"/>
               <a:t>Third level</a:t>
             </a:r>
           </a:p>
           <a:p>
             <a:pPr lvl="3"/>
             <a:r>
-              <a:rPr lang="en-US" smtClean="0"/>
+              <a:rPr lang="en-US"/>
               <a:t>Fourth level</a:t>
             </a:r>
           </a:p>
           <a:p>
             <a:pPr lvl="4"/>
             <a:r>
-              <a:rPr lang="en-US" smtClean="0"/>
+              <a:rPr lang="en-US"/>
               <a:t>Fifth level</a:t>
             </a:r>
-            <a:endParaRPr lang="en-US"/>
           </a:p>
         </p:txBody>
       </p:sp>
@@ -514,10 +517,9 @@
           <a:lstStyle/>
           <a:p>
             <a:r>
-              <a:rPr lang="en-US" smtClean="0"/>
+              <a:rPr lang="en-US"/>
               <a:t>Click to edit Master title style</a:t>
             </a:r>
-            <a:endParaRPr lang="en-US"/>
           </a:p>
         </p:txBody>
       </p:sp>
@@ -633,10 +635,9 @@
           </a:lstStyle>
           <a:p>
             <a:r>
-              <a:rPr lang="en-US" smtClean="0"/>
+              <a:rPr lang="en-US"/>
               <a:t>Click to edit Master subtitle style</a:t>
             </a:r>
-            <a:endParaRPr lang="en-US"/>
           </a:p>
         </p:txBody>
       </p:sp>
@@ -657,7 +658,7 @@
           <a:p>
             <a:fld id="{78C97017-6FC3-485B-9764-EAC9E56C1D49}" type="datetimeFigureOut">
               <a:rPr lang="en-US" smtClean="0"/>
-              <a:t>9/4/17</a:t>
+              <a:t>11/13/2017</a:t>
             </a:fld>
             <a:endParaRPr lang="en-US"/>
           </a:p>
@@ -751,10 +752,9 @@
           <a:lstStyle/>
           <a:p>
             <a:r>
-              <a:rPr lang="en-US" smtClean="0"/>
+              <a:rPr lang="en-US"/>
               <a:t>Click to edit Master title style</a:t>
             </a:r>
-            <a:endParaRPr lang="en-US"/>
           </a:p>
         </p:txBody>
       </p:sp>
@@ -775,38 +775,37 @@
           <a:p>
             <a:pPr lvl="0"/>
             <a:r>
-              <a:rPr lang="en-US" smtClean="0"/>
+              <a:rPr lang="en-US"/>
               <a:t>Click to edit Master text styles</a:t>
             </a:r>
           </a:p>
           <a:p>
             <a:pPr lvl="1"/>
             <a:r>
-              <a:rPr lang="en-US" smtClean="0"/>
+              <a:rPr lang="en-US"/>
               <a:t>Second level</a:t>
             </a:r>
           </a:p>
           <a:p>
             <a:pPr lvl="2"/>
             <a:r>
-              <a:rPr lang="en-US" smtClean="0"/>
+              <a:rPr lang="en-US"/>
               <a:t>Third level</a:t>
             </a:r>
           </a:p>
           <a:p>
             <a:pPr lvl="3"/>
             <a:r>
-              <a:rPr lang="en-US" smtClean="0"/>
+              <a:rPr lang="en-US"/>
               <a:t>Fourth level</a:t>
             </a:r>
           </a:p>
           <a:p>
             <a:pPr lvl="4"/>
             <a:r>
-              <a:rPr lang="en-US" smtClean="0"/>
+              <a:rPr lang="en-US"/>
               <a:t>Fifth level</a:t>
             </a:r>
-            <a:endParaRPr lang="en-US"/>
           </a:p>
         </p:txBody>
       </p:sp>
@@ -827,7 +826,7 @@
           <a:p>
             <a:fld id="{78C97017-6FC3-485B-9764-EAC9E56C1D49}" type="datetimeFigureOut">
               <a:rPr lang="en-US" smtClean="0"/>
-              <a:t>9/4/17</a:t>
+              <a:t>11/13/2017</a:t>
             </a:fld>
             <a:endParaRPr lang="en-US"/>
           </a:p>
@@ -926,10 +925,9 @@
           <a:lstStyle/>
           <a:p>
             <a:r>
-              <a:rPr lang="en-US" smtClean="0"/>
+              <a:rPr lang="en-US"/>
               <a:t>Click to edit Master title style</a:t>
             </a:r>
-            <a:endParaRPr lang="en-US"/>
           </a:p>
         </p:txBody>
       </p:sp>
@@ -955,38 +953,37 @@
           <a:p>
             <a:pPr lvl="0"/>
             <a:r>
-              <a:rPr lang="en-US" smtClean="0"/>
+              <a:rPr lang="en-US"/>
               <a:t>Click to edit Master text styles</a:t>
             </a:r>
           </a:p>
           <a:p>
             <a:pPr lvl="1"/>
             <a:r>
-              <a:rPr lang="en-US" smtClean="0"/>
+              <a:rPr lang="en-US"/>
               <a:t>Second level</a:t>
             </a:r>
           </a:p>
           <a:p>
             <a:pPr lvl="2"/>
             <a:r>
-              <a:rPr lang="en-US" smtClean="0"/>
+              <a:rPr lang="en-US"/>
               <a:t>Third level</a:t>
             </a:r>
           </a:p>
           <a:p>
             <a:pPr lvl="3"/>
             <a:r>
-              <a:rPr lang="en-US" smtClean="0"/>
+              <a:rPr lang="en-US"/>
               <a:t>Fourth level</a:t>
             </a:r>
           </a:p>
           <a:p>
             <a:pPr lvl="4"/>
             <a:r>
-              <a:rPr lang="en-US" smtClean="0"/>
+              <a:rPr lang="en-US"/>
               <a:t>Fifth level</a:t>
             </a:r>
-            <a:endParaRPr lang="en-US"/>
           </a:p>
         </p:txBody>
       </p:sp>
@@ -1007,7 +1004,7 @@
           <a:p>
             <a:fld id="{78C97017-6FC3-485B-9764-EAC9E56C1D49}" type="datetimeFigureOut">
               <a:rPr lang="en-US" smtClean="0"/>
-              <a:t>9/4/17</a:t>
+              <a:t>11/13/2017</a:t>
             </a:fld>
             <a:endParaRPr lang="en-US"/>
           </a:p>
@@ -1101,10 +1098,9 @@
           <a:lstStyle/>
           <a:p>
             <a:r>
-              <a:rPr lang="en-US" smtClean="0"/>
+              <a:rPr lang="en-US"/>
               <a:t>Click to edit Master title style</a:t>
             </a:r>
-            <a:endParaRPr lang="en-US"/>
           </a:p>
         </p:txBody>
       </p:sp>
@@ -1125,38 +1121,37 @@
           <a:p>
             <a:pPr lvl="0"/>
             <a:r>
-              <a:rPr lang="en-US" smtClean="0"/>
+              <a:rPr lang="en-US"/>
               <a:t>Click to edit Master text styles</a:t>
             </a:r>
           </a:p>
           <a:p>
             <a:pPr lvl="1"/>
             <a:r>
-              <a:rPr lang="en-US" smtClean="0"/>
+              <a:rPr lang="en-US"/>
               <a:t>Second level</a:t>
             </a:r>
           </a:p>
           <a:p>
             <a:pPr lvl="2"/>
             <a:r>
-              <a:rPr lang="en-US" smtClean="0"/>
+              <a:rPr lang="en-US"/>
               <a:t>Third level</a:t>
             </a:r>
           </a:p>
           <a:p>
             <a:pPr lvl="3"/>
             <a:r>
-              <a:rPr lang="en-US" smtClean="0"/>
+              <a:rPr lang="en-US"/>
               <a:t>Fourth level</a:t>
             </a:r>
           </a:p>
           <a:p>
             <a:pPr lvl="4"/>
             <a:r>
-              <a:rPr lang="en-US" smtClean="0"/>
+              <a:rPr lang="en-US"/>
               <a:t>Fifth level</a:t>
             </a:r>
-            <a:endParaRPr lang="en-US"/>
           </a:p>
         </p:txBody>
       </p:sp>
@@ -1177,7 +1172,7 @@
           <a:p>
             <a:fld id="{78C97017-6FC3-485B-9764-EAC9E56C1D49}" type="datetimeFigureOut">
               <a:rPr lang="en-US" smtClean="0"/>
-              <a:t>9/4/17</a:t>
+              <a:t>11/13/2017</a:t>
             </a:fld>
             <a:endParaRPr lang="en-US"/>
           </a:p>
@@ -1280,10 +1275,9 @@
           </a:lstStyle>
           <a:p>
             <a:r>
-              <a:rPr lang="en-US" smtClean="0"/>
+              <a:rPr lang="en-US"/>
               <a:t>Click to edit Master title style</a:t>
             </a:r>
-            <a:endParaRPr lang="en-US"/>
           </a:p>
         </p:txBody>
       </p:sp>
@@ -1400,7 +1394,7 @@
           <a:p>
             <a:pPr lvl="0"/>
             <a:r>
-              <a:rPr lang="en-US" smtClean="0"/>
+              <a:rPr lang="en-US"/>
               <a:t>Click to edit Master text styles</a:t>
             </a:r>
           </a:p>
@@ -1423,7 +1417,7 @@
           <a:p>
             <a:fld id="{78C97017-6FC3-485B-9764-EAC9E56C1D49}" type="datetimeFigureOut">
               <a:rPr lang="en-US" smtClean="0"/>
-              <a:t>9/4/17</a:t>
+              <a:t>11/13/2017</a:t>
             </a:fld>
             <a:endParaRPr lang="en-US"/>
           </a:p>
@@ -1517,10 +1511,9 @@
           <a:lstStyle/>
           <a:p>
             <a:r>
-              <a:rPr lang="en-US" smtClean="0"/>
+              <a:rPr lang="en-US"/>
               <a:t>Click to edit Master title style</a:t>
             </a:r>
-            <a:endParaRPr lang="en-US"/>
           </a:p>
         </p:txBody>
       </p:sp>
@@ -1574,38 +1567,37 @@
           <a:p>
             <a:pPr lvl="0"/>
             <a:r>
-              <a:rPr lang="en-US" smtClean="0"/>
+              <a:rPr lang="en-US"/>
               <a:t>Click to edit Master text styles</a:t>
             </a:r>
           </a:p>
           <a:p>
             <a:pPr lvl="1"/>
             <a:r>
-              <a:rPr lang="en-US" smtClean="0"/>
+              <a:rPr lang="en-US"/>
               <a:t>Second level</a:t>
             </a:r>
           </a:p>
           <a:p>
             <a:pPr lvl="2"/>
             <a:r>
-              <a:rPr lang="en-US" smtClean="0"/>
+              <a:rPr lang="en-US"/>
               <a:t>Third level</a:t>
             </a:r>
           </a:p>
           <a:p>
             <a:pPr lvl="3"/>
             <a:r>
-              <a:rPr lang="en-US" smtClean="0"/>
+              <a:rPr lang="en-US"/>
               <a:t>Fourth level</a:t>
             </a:r>
           </a:p>
           <a:p>
             <a:pPr lvl="4"/>
             <a:r>
-              <a:rPr lang="en-US" smtClean="0"/>
+              <a:rPr lang="en-US"/>
               <a:t>Fifth level</a:t>
             </a:r>
-            <a:endParaRPr lang="en-US"/>
           </a:p>
         </p:txBody>
       </p:sp>
@@ -1659,38 +1651,37 @@
           <a:p>
             <a:pPr lvl="0"/>
             <a:r>
-              <a:rPr lang="en-US" smtClean="0"/>
+              <a:rPr lang="en-US"/>
               <a:t>Click to edit Master text styles</a:t>
             </a:r>
           </a:p>
           <a:p>
             <a:pPr lvl="1"/>
             <a:r>
-              <a:rPr lang="en-US" smtClean="0"/>
+              <a:rPr lang="en-US"/>
               <a:t>Second level</a:t>
             </a:r>
           </a:p>
           <a:p>
             <a:pPr lvl="2"/>
             <a:r>
-              <a:rPr lang="en-US" smtClean="0"/>
+              <a:rPr lang="en-US"/>
               <a:t>Third level</a:t>
             </a:r>
           </a:p>
           <a:p>
             <a:pPr lvl="3"/>
             <a:r>
-              <a:rPr lang="en-US" smtClean="0"/>
+              <a:rPr lang="en-US"/>
               <a:t>Fourth level</a:t>
             </a:r>
           </a:p>
           <a:p>
             <a:pPr lvl="4"/>
             <a:r>
-              <a:rPr lang="en-US" smtClean="0"/>
+              <a:rPr lang="en-US"/>
               <a:t>Fifth level</a:t>
             </a:r>
-            <a:endParaRPr lang="en-US"/>
           </a:p>
         </p:txBody>
       </p:sp>
@@ -1711,7 +1702,7 @@
           <a:p>
             <a:fld id="{78C97017-6FC3-485B-9764-EAC9E56C1D49}" type="datetimeFigureOut">
               <a:rPr lang="en-US" smtClean="0"/>
-              <a:t>9/4/17</a:t>
+              <a:t>11/13/2017</a:t>
             </a:fld>
             <a:endParaRPr lang="en-US"/>
           </a:p>
@@ -1809,10 +1800,9 @@
           </a:lstStyle>
           <a:p>
             <a:r>
-              <a:rPr lang="en-US" smtClean="0"/>
+              <a:rPr lang="en-US"/>
               <a:t>Click to edit Master title style</a:t>
             </a:r>
-            <a:endParaRPr lang="en-US"/>
           </a:p>
         </p:txBody>
       </p:sp>
@@ -1875,7 +1865,7 @@
           <a:p>
             <a:pPr lvl="0"/>
             <a:r>
-              <a:rPr lang="en-US" smtClean="0"/>
+              <a:rPr lang="en-US"/>
               <a:t>Click to edit Master text styles</a:t>
             </a:r>
           </a:p>
@@ -1931,38 +1921,37 @@
           <a:p>
             <a:pPr lvl="0"/>
             <a:r>
-              <a:rPr lang="en-US" smtClean="0"/>
+              <a:rPr lang="en-US"/>
               <a:t>Click to edit Master text styles</a:t>
             </a:r>
           </a:p>
           <a:p>
             <a:pPr lvl="1"/>
             <a:r>
-              <a:rPr lang="en-US" smtClean="0"/>
+              <a:rPr lang="en-US"/>
               <a:t>Second level</a:t>
             </a:r>
           </a:p>
           <a:p>
             <a:pPr lvl="2"/>
             <a:r>
-              <a:rPr lang="en-US" smtClean="0"/>
+              <a:rPr lang="en-US"/>
               <a:t>Third level</a:t>
             </a:r>
           </a:p>
           <a:p>
             <a:pPr lvl="3"/>
             <a:r>
-              <a:rPr lang="en-US" smtClean="0"/>
+              <a:rPr lang="en-US"/>
               <a:t>Fourth level</a:t>
             </a:r>
           </a:p>
           <a:p>
             <a:pPr lvl="4"/>
             <a:r>
-              <a:rPr lang="en-US" smtClean="0"/>
+              <a:rPr lang="en-US"/>
               <a:t>Fifth level</a:t>
             </a:r>
-            <a:endParaRPr lang="en-US"/>
           </a:p>
         </p:txBody>
       </p:sp>
@@ -2025,7 +2014,7 @@
           <a:p>
             <a:pPr lvl="0"/>
             <a:r>
-              <a:rPr lang="en-US" smtClean="0"/>
+              <a:rPr lang="en-US"/>
               <a:t>Click to edit Master text styles</a:t>
             </a:r>
           </a:p>
@@ -2081,38 +2070,37 @@
           <a:p>
             <a:pPr lvl="0"/>
             <a:r>
-              <a:rPr lang="en-US" smtClean="0"/>
+              <a:rPr lang="en-US"/>
               <a:t>Click to edit Master text styles</a:t>
             </a:r>
           </a:p>
           <a:p>
             <a:pPr lvl="1"/>
             <a:r>
-              <a:rPr lang="en-US" smtClean="0"/>
+              <a:rPr lang="en-US"/>
               <a:t>Second level</a:t>
             </a:r>
           </a:p>
           <a:p>
             <a:pPr lvl="2"/>
             <a:r>
-              <a:rPr lang="en-US" smtClean="0"/>
+              <a:rPr lang="en-US"/>
               <a:t>Third level</a:t>
             </a:r>
           </a:p>
           <a:p>
             <a:pPr lvl="3"/>
             <a:r>
-              <a:rPr lang="en-US" smtClean="0"/>
+              <a:rPr lang="en-US"/>
               <a:t>Fourth level</a:t>
             </a:r>
           </a:p>
           <a:p>
             <a:pPr lvl="4"/>
             <a:r>
-              <a:rPr lang="en-US" smtClean="0"/>
+              <a:rPr lang="en-US"/>
               <a:t>Fifth level</a:t>
             </a:r>
-            <a:endParaRPr lang="en-US"/>
           </a:p>
         </p:txBody>
       </p:sp>
@@ -2133,7 +2121,7 @@
           <a:p>
             <a:fld id="{78C97017-6FC3-485B-9764-EAC9E56C1D49}" type="datetimeFigureOut">
               <a:rPr lang="en-US" smtClean="0"/>
-              <a:t>9/4/17</a:t>
+              <a:t>11/13/2017</a:t>
             </a:fld>
             <a:endParaRPr lang="en-US"/>
           </a:p>
@@ -2227,10 +2215,9 @@
           <a:lstStyle/>
           <a:p>
             <a:r>
-              <a:rPr lang="en-US" smtClean="0"/>
+              <a:rPr lang="en-US"/>
               <a:t>Click to edit Master title style</a:t>
             </a:r>
-            <a:endParaRPr lang="en-US"/>
           </a:p>
         </p:txBody>
       </p:sp>
@@ -2251,7 +2238,7 @@
           <a:p>
             <a:fld id="{78C97017-6FC3-485B-9764-EAC9E56C1D49}" type="datetimeFigureOut">
               <a:rPr lang="en-US" smtClean="0"/>
-              <a:t>9/4/17</a:t>
+              <a:t>11/13/2017</a:t>
             </a:fld>
             <a:endParaRPr lang="en-US"/>
           </a:p>
@@ -2346,7 +2333,7 @@
           <a:p>
             <a:fld id="{78C97017-6FC3-485B-9764-EAC9E56C1D49}" type="datetimeFigureOut">
               <a:rPr lang="en-US" smtClean="0"/>
-              <a:t>9/4/17</a:t>
+              <a:t>11/13/2017</a:t>
             </a:fld>
             <a:endParaRPr lang="en-US"/>
           </a:p>
@@ -2449,10 +2436,9 @@
           </a:lstStyle>
           <a:p>
             <a:r>
-              <a:rPr lang="en-US" smtClean="0"/>
+              <a:rPr lang="en-US"/>
               <a:t>Click to edit Master title style</a:t>
             </a:r>
-            <a:endParaRPr lang="en-US"/>
           </a:p>
         </p:txBody>
       </p:sp>
@@ -2506,38 +2492,37 @@
           <a:p>
             <a:pPr lvl="0"/>
             <a:r>
-              <a:rPr lang="en-US" smtClean="0"/>
+              <a:rPr lang="en-US"/>
               <a:t>Click to edit Master text styles</a:t>
             </a:r>
           </a:p>
           <a:p>
             <a:pPr lvl="1"/>
             <a:r>
-              <a:rPr lang="en-US" smtClean="0"/>
+              <a:rPr lang="en-US"/>
               <a:t>Second level</a:t>
             </a:r>
           </a:p>
           <a:p>
             <a:pPr lvl="2"/>
             <a:r>
-              <a:rPr lang="en-US" smtClean="0"/>
+              <a:rPr lang="en-US"/>
               <a:t>Third level</a:t>
             </a:r>
           </a:p>
           <a:p>
             <a:pPr lvl="3"/>
             <a:r>
-              <a:rPr lang="en-US" smtClean="0"/>
+              <a:rPr lang="en-US"/>
               <a:t>Fourth level</a:t>
             </a:r>
           </a:p>
           <a:p>
             <a:pPr lvl="4"/>
             <a:r>
-              <a:rPr lang="en-US" smtClean="0"/>
+              <a:rPr lang="en-US"/>
               <a:t>Fifth level</a:t>
             </a:r>
-            <a:endParaRPr lang="en-US"/>
           </a:p>
         </p:txBody>
       </p:sp>
@@ -2600,7 +2585,7 @@
           <a:p>
             <a:pPr lvl="0"/>
             <a:r>
-              <a:rPr lang="en-US" smtClean="0"/>
+              <a:rPr lang="en-US"/>
               <a:t>Click to edit Master text styles</a:t>
             </a:r>
           </a:p>
@@ -2623,7 +2608,7 @@
           <a:p>
             <a:fld id="{78C97017-6FC3-485B-9764-EAC9E56C1D49}" type="datetimeFigureOut">
               <a:rPr lang="en-US" smtClean="0"/>
-              <a:t>9/4/17</a:t>
+              <a:t>11/13/2017</a:t>
             </a:fld>
             <a:endParaRPr lang="en-US"/>
           </a:p>
@@ -2726,10 +2711,9 @@
           </a:lstStyle>
           <a:p>
             <a:r>
-              <a:rPr lang="en-US" smtClean="0"/>
+              <a:rPr lang="en-US"/>
               <a:t>Click to edit Master title style</a:t>
             </a:r>
-            <a:endParaRPr lang="en-US"/>
           </a:p>
         </p:txBody>
       </p:sp>
@@ -2853,7 +2837,7 @@
           <a:p>
             <a:pPr lvl="0"/>
             <a:r>
-              <a:rPr lang="en-US" smtClean="0"/>
+              <a:rPr lang="en-US"/>
               <a:t>Click to edit Master text styles</a:t>
             </a:r>
           </a:p>
@@ -2876,7 +2860,7 @@
           <a:p>
             <a:fld id="{78C97017-6FC3-485B-9764-EAC9E56C1D49}" type="datetimeFigureOut">
               <a:rPr lang="en-US" smtClean="0"/>
-              <a:t>9/4/17</a:t>
+              <a:t>11/13/2017</a:t>
             </a:fld>
             <a:endParaRPr lang="en-US"/>
           </a:p>
@@ -2985,10 +2969,9 @@
           <a:lstStyle/>
           <a:p>
             <a:r>
-              <a:rPr lang="en-US" smtClean="0"/>
+              <a:rPr lang="en-US"/>
               <a:t>Click to edit Master title style</a:t>
             </a:r>
-            <a:endParaRPr lang="en-US"/>
           </a:p>
         </p:txBody>
       </p:sp>
@@ -3019,38 +3002,37 @@
           <a:p>
             <a:pPr lvl="0"/>
             <a:r>
-              <a:rPr lang="en-US" smtClean="0"/>
+              <a:rPr lang="en-US"/>
               <a:t>Click to edit Master text styles</a:t>
             </a:r>
           </a:p>
           <a:p>
             <a:pPr lvl="1"/>
             <a:r>
-              <a:rPr lang="en-US" smtClean="0"/>
+              <a:rPr lang="en-US"/>
               <a:t>Second level</a:t>
             </a:r>
           </a:p>
           <a:p>
             <a:pPr lvl="2"/>
             <a:r>
-              <a:rPr lang="en-US" smtClean="0"/>
+              <a:rPr lang="en-US"/>
               <a:t>Third level</a:t>
             </a:r>
           </a:p>
           <a:p>
             <a:pPr lvl="3"/>
             <a:r>
-              <a:rPr lang="en-US" smtClean="0"/>
+              <a:rPr lang="en-US"/>
               <a:t>Fourth level</a:t>
             </a:r>
           </a:p>
           <a:p>
             <a:pPr lvl="4"/>
             <a:r>
-              <a:rPr lang="en-US" smtClean="0"/>
+              <a:rPr lang="en-US"/>
               <a:t>Fifth level</a:t>
             </a:r>
-            <a:endParaRPr lang="en-US"/>
           </a:p>
         </p:txBody>
       </p:sp>
@@ -3089,7 +3071,7 @@
           <a:p>
             <a:fld id="{78C97017-6FC3-485B-9764-EAC9E56C1D49}" type="datetimeFigureOut">
               <a:rPr lang="en-US" smtClean="0"/>
-              <a:t>9/4/17</a:t>
+              <a:t>11/13/2017</a:t>
             </a:fld>
             <a:endParaRPr lang="en-US"/>
           </a:p>
@@ -3472,8 +3454,8 @@
         </p:nvSpPr>
         <p:spPr>
           <a:xfrm>
-            <a:off x="1119865" y="1727200"/>
-            <a:ext cx="7490735" cy="2997200"/>
+            <a:off x="609600" y="609600"/>
+            <a:ext cx="7444464" cy="4421036"/>
           </a:xfrm>
           <a:prstGeom prst="roundRect">
             <a:avLst>
@@ -3510,7 +3492,7 @@
           <a:lstStyle/>
           <a:p>
             <a:r>
-              <a:rPr lang="en-US" sz="1200" b="1" dirty="0" smtClean="0">
+              <a:rPr lang="en-US" sz="1200" b="1" dirty="0">
                 <a:solidFill>
                   <a:srgbClr val="7030A0"/>
                 </a:solidFill>
@@ -3533,7 +3515,7 @@
         </p:nvSpPr>
         <p:spPr>
           <a:xfrm>
-            <a:off x="2877180" y="3158440"/>
+            <a:off x="2366914" y="2040840"/>
             <a:ext cx="1093635" cy="346760"/>
           </a:xfrm>
           <a:prstGeom prst="rect">
@@ -3569,7 +3551,7 @@
           <a:p>
             <a:pPr algn="ctr"/>
             <a:r>
-              <a:rPr lang="en-US" sz="1050" dirty="0" err="1" smtClean="0">
+              <a:rPr lang="en-US" sz="1050" dirty="0" err="1">
                 <a:solidFill>
                   <a:schemeClr val="bg1"/>
                 </a:solidFill>
@@ -3592,7 +3574,7 @@
         </p:nvSpPr>
         <p:spPr>
           <a:xfrm rot="16200000">
-            <a:off x="1683963" y="2868687"/>
+            <a:off x="1173697" y="1751087"/>
             <a:ext cx="1093635" cy="346760"/>
           </a:xfrm>
           <a:prstGeom prst="rect">
@@ -3628,7 +3610,7 @@
           <a:p>
             <a:pPr algn="ctr"/>
             <a:r>
-              <a:rPr lang="en-US" sz="1050" dirty="0" err="1" smtClean="0">
+              <a:rPr lang="en-US" sz="1050" dirty="0" err="1">
                 <a:solidFill>
                   <a:schemeClr val="bg1"/>
                 </a:solidFill>
@@ -3647,17 +3629,20 @@
         <p:nvCxnSpPr>
           <p:cNvPr id="53" name="Elbow Connector 63"/>
           <p:cNvCxnSpPr>
+            <a:cxnSpLocks/>
             <a:stCxn id="71" idx="3"/>
           </p:cNvCxnSpPr>
           <p:nvPr/>
         </p:nvCxnSpPr>
         <p:spPr>
-          <a:xfrm flipV="1">
-            <a:off x="6477000" y="3194131"/>
-            <a:ext cx="95385" cy="416514"/>
-          </a:xfrm>
-          <a:prstGeom prst="bentConnector2">
-            <a:avLst/>
+          <a:xfrm rot="5400000">
+            <a:off x="6298833" y="1385871"/>
+            <a:ext cx="391377" cy="277476"/>
+          </a:xfrm>
+          <a:prstGeom prst="bentConnector3">
+            <a:avLst>
+              <a:gd name="adj1" fmla="val 50000"/>
+            </a:avLst>
           </a:prstGeom>
           <a:ln w="19050">
             <a:solidFill>
@@ -3688,13 +3673,14 @@
         <p:nvCxnSpPr>
           <p:cNvPr id="107" name="Elbow Connector 106"/>
           <p:cNvCxnSpPr>
+            <a:cxnSpLocks/>
             <a:stCxn id="9" idx="1"/>
           </p:cNvCxnSpPr>
           <p:nvPr/>
         </p:nvCxnSpPr>
         <p:spPr>
           <a:xfrm rot="5400000" flipH="1" flipV="1">
-            <a:off x="4360065" y="1080909"/>
+            <a:off x="3849799" y="-36691"/>
             <a:ext cx="378691" cy="4637261"/>
           </a:xfrm>
           <a:prstGeom prst="bentConnector4">
@@ -3736,7 +3722,7 @@
         </p:nvSpPr>
         <p:spPr>
           <a:xfrm rot="16200000">
-            <a:off x="956202" y="2861202"/>
+            <a:off x="445936" y="1743602"/>
             <a:ext cx="1093635" cy="346760"/>
           </a:xfrm>
           <a:prstGeom prst="rect">
@@ -3783,7 +3769,7 @@
           <a:p>
             <a:pPr algn="ctr"/>
             <a:r>
-              <a:rPr lang="en-US" sz="1050" dirty="0" smtClean="0">
+              <a:rPr lang="en-US" sz="1050" dirty="0">
                 <a:solidFill>
                   <a:schemeClr val="bg1"/>
                 </a:solidFill>
@@ -3806,7 +3792,7 @@
         </p:nvSpPr>
         <p:spPr>
           <a:xfrm rot="16200000">
-            <a:off x="1626910" y="2952291"/>
+            <a:off x="1116644" y="1834691"/>
             <a:ext cx="270504" cy="175523"/>
           </a:xfrm>
           <a:prstGeom prst="triangle">
@@ -3856,7 +3842,7 @@
         </p:nvCxnSpPr>
         <p:spPr>
           <a:xfrm>
-            <a:off x="2656370" y="3326536"/>
+            <a:off x="2146104" y="2208936"/>
             <a:ext cx="220810" cy="5284"/>
           </a:xfrm>
           <a:prstGeom prst="straightConnector1">
@@ -3893,8 +3879,8 @@
           <p:nvPr/>
         </p:nvSpPr>
         <p:spPr>
-          <a:xfrm rot="5400000" flipV="1">
-            <a:off x="6253986" y="3522883"/>
+          <a:xfrm rot="10800000" flipV="1">
+            <a:off x="6498007" y="1153398"/>
             <a:ext cx="270504" cy="175523"/>
           </a:xfrm>
           <a:prstGeom prst="triangle">
@@ -3945,7 +3931,7 @@
         </p:nvCxnSpPr>
         <p:spPr>
           <a:xfrm>
-            <a:off x="910091" y="3040053"/>
+            <a:off x="399825" y="1922453"/>
             <a:ext cx="419548" cy="2860"/>
           </a:xfrm>
           <a:prstGeom prst="bentConnector3">
@@ -3990,7 +3976,7 @@
         </p:nvCxnSpPr>
         <p:spPr>
           <a:xfrm flipV="1">
-            <a:off x="1849924" y="3040052"/>
+            <a:off x="1339658" y="1922452"/>
             <a:ext cx="216105" cy="1"/>
           </a:xfrm>
           <a:prstGeom prst="line">
@@ -4029,7 +4015,7 @@
         </p:nvSpPr>
         <p:spPr>
           <a:xfrm>
-            <a:off x="2420322" y="3239846"/>
+            <a:off x="1910056" y="2122246"/>
             <a:ext cx="236048" cy="173380"/>
           </a:xfrm>
           <a:prstGeom prst="flowChartDecision">
@@ -4074,7 +4060,7 @@
         </p:nvSpPr>
         <p:spPr>
           <a:xfrm>
-            <a:off x="2879490" y="2627420"/>
+            <a:off x="2369224" y="1509820"/>
             <a:ext cx="1093635" cy="346760"/>
           </a:xfrm>
           <a:prstGeom prst="rect">
@@ -4107,7 +4093,7 @@
           <a:p>
             <a:pPr algn="ctr"/>
             <a:r>
-              <a:rPr lang="en-US" sz="1050" dirty="0" err="1" smtClean="0">
+              <a:rPr lang="en-US" sz="1050" dirty="0" err="1">
                 <a:solidFill>
                   <a:srgbClr val="7030A0"/>
                 </a:solidFill>
@@ -4133,7 +4119,7 @@
         </p:nvCxnSpPr>
         <p:spPr>
           <a:xfrm>
-            <a:off x="2658680" y="2795516"/>
+            <a:off x="2148414" y="1677916"/>
             <a:ext cx="220810" cy="5284"/>
           </a:xfrm>
           <a:prstGeom prst="straightConnector1">
@@ -4171,7 +4157,7 @@
         </p:nvSpPr>
         <p:spPr>
           <a:xfrm>
-            <a:off x="2422632" y="2708826"/>
+            <a:off x="1912366" y="1591226"/>
             <a:ext cx="236048" cy="173380"/>
           </a:xfrm>
           <a:prstGeom prst="flowChartDecision">
@@ -4216,7 +4202,7 @@
         </p:nvSpPr>
         <p:spPr>
           <a:xfrm>
-            <a:off x="4487017" y="2847371"/>
+            <a:off x="3976751" y="1729771"/>
             <a:ext cx="1156969" cy="346760"/>
           </a:xfrm>
           <a:prstGeom prst="rect">
@@ -4249,7 +4235,7 @@
           <a:p>
             <a:pPr algn="ctr"/>
             <a:r>
-              <a:rPr lang="en-US" sz="1050" dirty="0" err="1" smtClean="0">
+              <a:rPr lang="en-US" sz="1050" dirty="0" err="1">
                 <a:solidFill>
                   <a:srgbClr val="7030A0"/>
                 </a:solidFill>
@@ -4272,7 +4258,7 @@
         </p:nvSpPr>
         <p:spPr>
           <a:xfrm>
-            <a:off x="3984303" y="2673991"/>
+            <a:off x="3474037" y="1556391"/>
             <a:ext cx="236048" cy="173380"/>
           </a:xfrm>
           <a:prstGeom prst="flowChartDecision">
@@ -4322,7 +4308,7 @@
         </p:nvCxnSpPr>
         <p:spPr>
           <a:xfrm>
-            <a:off x="4220351" y="2760681"/>
+            <a:off x="3710085" y="1643081"/>
             <a:ext cx="266666" cy="260070"/>
           </a:xfrm>
           <a:prstGeom prst="bentConnector3">
@@ -4360,7 +4346,7 @@
         </p:nvSpPr>
         <p:spPr>
           <a:xfrm>
-            <a:off x="4477328" y="2280569"/>
+            <a:off x="3967062" y="1162969"/>
             <a:ext cx="1156969" cy="346760"/>
           </a:xfrm>
           <a:prstGeom prst="rect">
@@ -4393,7 +4379,7 @@
           <a:p>
             <a:pPr algn="ctr"/>
             <a:r>
-              <a:rPr lang="en-US" sz="1050" dirty="0" err="1" smtClean="0">
+              <a:rPr lang="en-US" sz="1050" dirty="0" err="1">
                 <a:solidFill>
                   <a:srgbClr val="7030A0"/>
                 </a:solidFill>
@@ -4419,7 +4405,7 @@
         </p:nvCxnSpPr>
         <p:spPr>
           <a:xfrm flipV="1">
-            <a:off x="4220351" y="2453949"/>
+            <a:off x="3710085" y="1336349"/>
             <a:ext cx="256977" cy="306732"/>
           </a:xfrm>
           <a:prstGeom prst="bentConnector3">
@@ -4459,7 +4445,7 @@
         </p:nvSpPr>
         <p:spPr>
           <a:xfrm>
-            <a:off x="6313677" y="2858066"/>
+            <a:off x="5803411" y="1740466"/>
             <a:ext cx="708186" cy="346760"/>
           </a:xfrm>
           <a:prstGeom prst="rect">
@@ -4492,7 +4478,7 @@
           <a:p>
             <a:pPr algn="ctr"/>
             <a:r>
-              <a:rPr lang="en-US" sz="1050" dirty="0" smtClean="0">
+              <a:rPr lang="en-US" sz="1050" dirty="0">
                 <a:solidFill>
                   <a:srgbClr val="7030A0"/>
                 </a:solidFill>
@@ -4515,7 +4501,7 @@
         </p:nvSpPr>
         <p:spPr>
           <a:xfrm>
-            <a:off x="5643227" y="2943979"/>
+            <a:off x="5132961" y="1826379"/>
             <a:ext cx="236048" cy="173380"/>
           </a:xfrm>
           <a:prstGeom prst="flowChartDecision">
@@ -4563,7 +4549,7 @@
         </p:nvCxnSpPr>
         <p:spPr>
           <a:xfrm>
-            <a:off x="5879275" y="3030669"/>
+            <a:off x="5369009" y="1913069"/>
             <a:ext cx="434402" cy="777"/>
           </a:xfrm>
           <a:prstGeom prst="bentConnector3">
@@ -4601,7 +4587,7 @@
         </p:nvSpPr>
         <p:spPr>
           <a:xfrm>
-            <a:off x="5336105" y="1809332"/>
+            <a:off x="4825839" y="691732"/>
             <a:ext cx="483700" cy="346760"/>
           </a:xfrm>
           <a:prstGeom prst="rect">
@@ -4634,7 +4620,7 @@
           <a:p>
             <a:pPr algn="ctr"/>
             <a:r>
-              <a:rPr lang="en-US" sz="1050" dirty="0" smtClean="0">
+              <a:rPr lang="en-US" sz="1050" dirty="0">
                 <a:solidFill>
                   <a:srgbClr val="7030A0"/>
                 </a:solidFill>
@@ -4657,7 +4643,7 @@
         </p:nvSpPr>
         <p:spPr>
           <a:xfrm rot="16200000">
-            <a:off x="4921666" y="2066540"/>
+            <a:off x="4411400" y="948940"/>
             <a:ext cx="236048" cy="173380"/>
           </a:xfrm>
           <a:prstGeom prst="flowChartDecision">
@@ -4705,7 +4691,7 @@
         </p:nvCxnSpPr>
         <p:spPr>
           <a:xfrm rot="5400000" flipH="1" flipV="1">
-            <a:off x="5161650" y="1860752"/>
+            <a:off x="4651384" y="743152"/>
             <a:ext cx="52494" cy="296415"/>
           </a:xfrm>
           <a:prstGeom prst="bentConnector2">
@@ -4743,7 +4729,7 @@
         </p:nvSpPr>
         <p:spPr>
           <a:xfrm>
-            <a:off x="5128257" y="3429000"/>
+            <a:off x="5643580" y="783206"/>
             <a:ext cx="1156969" cy="346760"/>
           </a:xfrm>
           <a:prstGeom prst="rect">
@@ -4776,7 +4762,7 @@
           <a:p>
             <a:pPr algn="ctr"/>
             <a:r>
-              <a:rPr lang="en-US" sz="1050" dirty="0" smtClean="0">
+              <a:rPr lang="en-US" sz="1050" dirty="0">
                 <a:solidFill>
                   <a:srgbClr val="7030A0"/>
                 </a:solidFill>
@@ -4784,14 +4770,14 @@
               <a:t>&lt;&lt;interface&gt;&gt;</a:t>
             </a:r>
             <a:br>
-              <a:rPr lang="en-US" sz="1050" dirty="0" smtClean="0">
+              <a:rPr lang="en-US" sz="1050" dirty="0">
                 <a:solidFill>
                   <a:srgbClr val="7030A0"/>
                 </a:solidFill>
               </a:rPr>
             </a:br>
             <a:r>
-              <a:rPr lang="en-US" sz="1050" dirty="0" err="1" smtClean="0">
+              <a:rPr lang="en-US" sz="1050" dirty="0" err="1">
                 <a:solidFill>
                   <a:srgbClr val="7030A0"/>
                 </a:solidFill>
@@ -4814,7 +4800,7 @@
         </p:nvSpPr>
         <p:spPr>
           <a:xfrm>
-            <a:off x="7712397" y="2564238"/>
+            <a:off x="7231974" y="1008122"/>
             <a:ext cx="708186" cy="285783"/>
           </a:xfrm>
           <a:prstGeom prst="rect">
@@ -4847,7 +4833,7 @@
           <a:p>
             <a:pPr algn="ctr"/>
             <a:r>
-              <a:rPr lang="en-US" sz="1050" dirty="0" smtClean="0">
+              <a:rPr lang="en-US" sz="1050" dirty="0">
                 <a:solidFill>
                   <a:srgbClr val="7030A0"/>
                 </a:solidFill>
@@ -4870,7 +4856,7 @@
         </p:nvSpPr>
         <p:spPr>
           <a:xfrm>
-            <a:off x="7041947" y="2948201"/>
+            <a:off x="6531681" y="1830601"/>
             <a:ext cx="236048" cy="173380"/>
           </a:xfrm>
           <a:prstGeom prst="flowChartDecision">
@@ -4920,8 +4906,8 @@
         </p:nvCxnSpPr>
         <p:spPr>
           <a:xfrm flipV="1">
-            <a:off x="7277995" y="2707130"/>
-            <a:ext cx="434402" cy="327761"/>
+            <a:off x="6767729" y="1151014"/>
+            <a:ext cx="464245" cy="766277"/>
           </a:xfrm>
           <a:prstGeom prst="bentConnector3">
             <a:avLst/>
@@ -4958,7 +4944,7 @@
         </p:nvSpPr>
         <p:spPr>
           <a:xfrm>
-            <a:off x="7712397" y="2887216"/>
+            <a:off x="7231974" y="1331100"/>
             <a:ext cx="708186" cy="285783"/>
           </a:xfrm>
           <a:prstGeom prst="rect">
@@ -4991,7 +4977,7 @@
           <a:p>
             <a:pPr algn="ctr"/>
             <a:r>
-              <a:rPr lang="en-US" sz="1050" dirty="0" smtClean="0">
+              <a:rPr lang="en-US" sz="1050" dirty="0">
                 <a:solidFill>
                   <a:srgbClr val="7030A0"/>
                 </a:solidFill>
@@ -5017,8 +5003,8 @@
         </p:nvCxnSpPr>
         <p:spPr>
           <a:xfrm flipV="1">
-            <a:off x="7277995" y="3030108"/>
-            <a:ext cx="434402" cy="4783"/>
+            <a:off x="6767729" y="1473992"/>
+            <a:ext cx="464245" cy="443299"/>
           </a:xfrm>
           <a:prstGeom prst="bentConnector3">
             <a:avLst/>
@@ -5055,7 +5041,7 @@
         </p:nvSpPr>
         <p:spPr>
           <a:xfrm>
-            <a:off x="7712397" y="3210194"/>
+            <a:off x="7231974" y="1654078"/>
             <a:ext cx="708186" cy="285783"/>
           </a:xfrm>
           <a:prstGeom prst="rect">
@@ -5088,7 +5074,7 @@
           <a:p>
             <a:pPr algn="ctr"/>
             <a:r>
-              <a:rPr lang="en-US" sz="1050" dirty="0" smtClean="0">
+              <a:rPr lang="en-US" sz="1050" dirty="0">
                 <a:solidFill>
                   <a:srgbClr val="7030A0"/>
                 </a:solidFill>
@@ -5113,9 +5099,9 @@
           <p:nvPr/>
         </p:nvCxnSpPr>
         <p:spPr>
-          <a:xfrm>
-            <a:off x="7277995" y="3034891"/>
-            <a:ext cx="434402" cy="318195"/>
+          <a:xfrm flipV="1">
+            <a:off x="6767729" y="1796970"/>
+            <a:ext cx="464245" cy="120321"/>
           </a:xfrm>
           <a:prstGeom prst="bentConnector3">
             <a:avLst/>
@@ -5152,7 +5138,7 @@
         </p:nvSpPr>
         <p:spPr>
           <a:xfrm>
-            <a:off x="7712397" y="3533171"/>
+            <a:off x="7231974" y="1977055"/>
             <a:ext cx="708186" cy="285783"/>
           </a:xfrm>
           <a:prstGeom prst="rect">
@@ -5185,7 +5171,7 @@
           <a:p>
             <a:pPr algn="ctr"/>
             <a:r>
-              <a:rPr lang="en-US" sz="1050" dirty="0" smtClean="0">
+              <a:rPr lang="en-US" sz="1050" dirty="0">
                 <a:solidFill>
                   <a:srgbClr val="7030A0"/>
                 </a:solidFill>
@@ -5211,8 +5197,8 @@
         </p:nvCxnSpPr>
         <p:spPr>
           <a:xfrm>
-            <a:off x="7277995" y="3034891"/>
-            <a:ext cx="434402" cy="641172"/>
+            <a:off x="6767729" y="1917291"/>
+            <a:ext cx="464245" cy="202656"/>
           </a:xfrm>
           <a:prstGeom prst="bentConnector3">
             <a:avLst/>
@@ -5251,7 +5237,7 @@
         </p:nvCxnSpPr>
         <p:spPr>
           <a:xfrm rot="16200000" flipH="1">
-            <a:off x="3279321" y="2485431"/>
+            <a:off x="2769055" y="1367831"/>
             <a:ext cx="293825" cy="1"/>
           </a:xfrm>
           <a:prstGeom prst="bentConnector3">
@@ -5292,7 +5278,7 @@
         </p:nvSpPr>
         <p:spPr>
           <a:xfrm rot="10800000" flipV="1">
-            <a:off x="3290981" y="2162997"/>
+            <a:off x="2780715" y="1045397"/>
             <a:ext cx="270504" cy="175523"/>
           </a:xfrm>
           <a:prstGeom prst="triangle">
@@ -5340,7 +5326,7 @@
         </p:nvSpPr>
         <p:spPr>
           <a:xfrm>
-            <a:off x="2660303" y="1806470"/>
+            <a:off x="2150037" y="688870"/>
             <a:ext cx="1539926" cy="346760"/>
           </a:xfrm>
           <a:prstGeom prst="rect">
@@ -5373,7 +5359,7 @@
           <a:p>
             <a:pPr algn="ctr"/>
             <a:r>
-              <a:rPr lang="en-US" sz="1050" dirty="0" smtClean="0">
+              <a:rPr lang="en-US" sz="1050" dirty="0">
                 <a:solidFill>
                   <a:srgbClr val="7030A0"/>
                 </a:solidFill>
@@ -5381,14 +5367,14 @@
               <a:t>&lt;&lt;interface&gt;&gt;</a:t>
             </a:r>
             <a:br>
-              <a:rPr lang="en-US" sz="1050" dirty="0" smtClean="0">
+              <a:rPr lang="en-US" sz="1050" dirty="0">
                 <a:solidFill>
                   <a:srgbClr val="7030A0"/>
                 </a:solidFill>
               </a:rPr>
             </a:br>
             <a:r>
-              <a:rPr lang="en-US" sz="1050" dirty="0" err="1" smtClean="0">
+              <a:rPr lang="en-US" sz="1050" dirty="0" err="1">
                 <a:solidFill>
                   <a:srgbClr val="7030A0"/>
                 </a:solidFill>
@@ -5411,7 +5397,7 @@
         </p:nvSpPr>
         <p:spPr>
           <a:xfrm rot="16200000">
-            <a:off x="6527512" y="3586305"/>
+            <a:off x="6017246" y="2468705"/>
             <a:ext cx="881018" cy="261610"/>
           </a:xfrm>
           <a:prstGeom prst="rect">
@@ -5427,7 +5413,7 @@
           <a:p>
             <a:pPr algn="r"/>
             <a:r>
-              <a:rPr lang="en-US" sz="1100" dirty="0" smtClean="0">
+              <a:rPr lang="en-US" sz="1100" dirty="0">
                 <a:solidFill>
                   <a:srgbClr val="7030A0"/>
                 </a:solidFill>
@@ -5450,7 +5436,7 @@
         </p:nvSpPr>
         <p:spPr>
           <a:xfrm>
-            <a:off x="2057401" y="4239491"/>
+            <a:off x="1547134" y="3954279"/>
             <a:ext cx="1066800" cy="346760"/>
           </a:xfrm>
           <a:prstGeom prst="rect">
@@ -5483,30 +5469,22 @@
           <a:p>
             <a:pPr algn="ctr"/>
             <a:r>
-              <a:rPr lang="en-US" sz="1050" dirty="0" smtClean="0">
+              <a:rPr lang="en-US" sz="1050" dirty="0">
                 <a:solidFill>
                   <a:srgbClr val="7030A0"/>
                 </a:solidFill>
               </a:rPr>
               <a:t>&lt;&lt;interface&gt;&gt;</a:t>
             </a:r>
-            <a:r>
-              <a:rPr lang="en-US" sz="1050">
-                <a:solidFill>
-                  <a:srgbClr val="7030A0"/>
-                </a:solidFill>
-              </a:rPr>
-              <a:t/>
-            </a:r>
             <a:br>
-              <a:rPr lang="en-US" sz="1050">
+              <a:rPr lang="en-US" sz="1050" dirty="0">
                 <a:solidFill>
                   <a:srgbClr val="7030A0"/>
                 </a:solidFill>
               </a:rPr>
             </a:br>
             <a:r>
-              <a:rPr lang="en-US" sz="1050" dirty="0" err="1" smtClean="0">
+              <a:rPr lang="en-US" sz="1050" dirty="0" err="1">
                 <a:solidFill>
                   <a:srgbClr val="7030A0"/>
                 </a:solidFill>
@@ -5532,8 +5510,8 @@
         </p:nvCxnSpPr>
         <p:spPr>
           <a:xfrm rot="16200000" flipH="1">
-            <a:off x="1364475" y="3719944"/>
-            <a:ext cx="831471" cy="554381"/>
+            <a:off x="438015" y="3018539"/>
+            <a:ext cx="1663859" cy="554380"/>
           </a:xfrm>
           <a:prstGeom prst="bentConnector2">
             <a:avLst/>
@@ -5574,7 +5552,7 @@
         </p:nvCxnSpPr>
         <p:spPr>
           <a:xfrm rot="16200000" flipV="1">
-            <a:off x="5948976" y="2139271"/>
+            <a:off x="5438710" y="1021671"/>
             <a:ext cx="404117" cy="1033473"/>
           </a:xfrm>
           <a:prstGeom prst="bentConnector2">
@@ -5612,7 +5590,7 @@
         </p:nvSpPr>
         <p:spPr>
           <a:xfrm>
-            <a:off x="4324972" y="2191228"/>
+            <a:off x="3814706" y="1073628"/>
             <a:ext cx="189257" cy="178683"/>
           </a:xfrm>
           <a:prstGeom prst="rect">
@@ -5628,7 +5606,7 @@
           <a:p>
             <a:pPr algn="ctr"/>
             <a:r>
-              <a:rPr lang="en-US" sz="1100" dirty="0" smtClean="0">
+              <a:rPr lang="en-US" sz="1100" dirty="0">
                 <a:solidFill>
                   <a:srgbClr val="7030A0"/>
                 </a:solidFill>
@@ -5651,7 +5629,7 @@
         </p:nvSpPr>
         <p:spPr>
           <a:xfrm>
-            <a:off x="4324972" y="3058864"/>
+            <a:off x="3814706" y="1941264"/>
             <a:ext cx="189257" cy="178683"/>
           </a:xfrm>
           <a:prstGeom prst="rect">
@@ -5667,7 +5645,7 @@
           <a:p>
             <a:pPr algn="ctr"/>
             <a:r>
-              <a:rPr lang="en-US" sz="1100" dirty="0" smtClean="0">
+              <a:rPr lang="en-US" sz="1100" dirty="0">
                 <a:solidFill>
                   <a:srgbClr val="7030A0"/>
                 </a:solidFill>
@@ -5690,7 +5668,7 @@
         </p:nvSpPr>
         <p:spPr>
           <a:xfrm>
-            <a:off x="5689761" y="2495413"/>
+            <a:off x="5179495" y="1377813"/>
             <a:ext cx="189257" cy="178683"/>
           </a:xfrm>
           <a:prstGeom prst="rect">
@@ -5706,7 +5684,7 @@
           <a:p>
             <a:pPr algn="ctr"/>
             <a:r>
-              <a:rPr lang="en-US" sz="1100" dirty="0" smtClean="0">
+              <a:rPr lang="en-US" sz="1100" dirty="0">
                 <a:solidFill>
                   <a:srgbClr val="7030A0"/>
                 </a:solidFill>
@@ -5729,7 +5707,7 @@
         </p:nvSpPr>
         <p:spPr>
           <a:xfrm>
-            <a:off x="5163172" y="1778919"/>
+            <a:off x="4652906" y="661319"/>
             <a:ext cx="189257" cy="178683"/>
           </a:xfrm>
           <a:prstGeom prst="rect">
@@ -5745,7 +5723,7 @@
           <a:p>
             <a:pPr algn="ctr"/>
             <a:r>
-              <a:rPr lang="en-US" sz="1100" dirty="0" smtClean="0">
+              <a:rPr lang="en-US" sz="1100" dirty="0">
                 <a:solidFill>
                   <a:srgbClr val="7030A0"/>
                 </a:solidFill>
@@ -5768,7 +5746,7 @@
         </p:nvSpPr>
         <p:spPr>
           <a:xfrm>
-            <a:off x="6135256" y="3097917"/>
+            <a:off x="5624990" y="1980317"/>
             <a:ext cx="189257" cy="178683"/>
           </a:xfrm>
           <a:prstGeom prst="rect">
@@ -5784,7 +5762,7 @@
           <a:p>
             <a:pPr algn="ctr"/>
             <a:r>
-              <a:rPr lang="en-US" sz="1100" dirty="0" smtClean="0">
+              <a:rPr lang="en-US" sz="1100" dirty="0">
                 <a:solidFill>
                   <a:srgbClr val="7030A0"/>
                 </a:solidFill>
@@ -5807,7 +5785,7 @@
         </p:nvSpPr>
         <p:spPr>
           <a:xfrm>
-            <a:off x="2687923" y="2564238"/>
+            <a:off x="2177657" y="1446638"/>
             <a:ext cx="189257" cy="178683"/>
           </a:xfrm>
           <a:prstGeom prst="rect">
@@ -5823,7 +5801,7 @@
           <a:p>
             <a:pPr algn="ctr"/>
             <a:r>
-              <a:rPr lang="en-US" sz="1100" dirty="0" smtClean="0">
+              <a:rPr lang="en-US" sz="1100" dirty="0">
                 <a:solidFill>
                   <a:srgbClr val="7030A0"/>
                 </a:solidFill>
@@ -5846,7 +5824,7 @@
         </p:nvSpPr>
         <p:spPr>
           <a:xfrm>
-            <a:off x="2656370" y="3386050"/>
+            <a:off x="2146104" y="2268450"/>
             <a:ext cx="189257" cy="178683"/>
           </a:xfrm>
           <a:prstGeom prst="rect">
@@ -5862,7 +5840,7 @@
           <a:p>
             <a:pPr algn="ctr"/>
             <a:r>
-              <a:rPr lang="en-US" sz="1100" dirty="0" smtClean="0">
+              <a:rPr lang="en-US" sz="1100" dirty="0">
                 <a:solidFill>
                   <a:srgbClr val="7030A0"/>
                 </a:solidFill>
@@ -5885,7 +5863,7 @@
         </p:nvSpPr>
         <p:spPr>
           <a:xfrm>
-            <a:off x="6667770" y="3210194"/>
+            <a:off x="6157504" y="2092594"/>
             <a:ext cx="189257" cy="178683"/>
           </a:xfrm>
           <a:prstGeom prst="rect">
@@ -5901,7 +5879,7 @@
           <a:p>
             <a:pPr algn="ctr"/>
             <a:r>
-              <a:rPr lang="en-US" sz="1100" dirty="0" smtClean="0">
+              <a:rPr lang="en-US" sz="1100" dirty="0">
                 <a:solidFill>
                   <a:srgbClr val="7030A0"/>
                 </a:solidFill>
@@ -5916,6 +5894,1641 @@
           </a:p>
         </p:txBody>
       </p:sp>
+      <p:sp>
+        <p:nvSpPr>
+          <p:cNvPr id="55" name="Rectangle 8">
+            <a:extLst>
+              <a:ext uri="{FF2B5EF4-FFF2-40B4-BE49-F238E27FC236}">
+                <a16:creationId xmlns:a16="http://schemas.microsoft.com/office/drawing/2014/main" id="{B88B40FD-63C5-4168-B2AA-ED0A3B57249D}"/>
+              </a:ext>
+            </a:extLst>
+          </p:cNvPr>
+          <p:cNvSpPr/>
+          <p:nvPr/>
+        </p:nvSpPr>
+        <p:spPr>
+          <a:xfrm>
+            <a:off x="7231974" y="2298712"/>
+            <a:ext cx="708186" cy="285783"/>
+          </a:xfrm>
+          <a:prstGeom prst="rect">
+            <a:avLst/>
+          </a:prstGeom>
+          <a:ln w="19050">
+            <a:solidFill>
+              <a:srgbClr val="7030A0"/>
+            </a:solidFill>
+          </a:ln>
+          <a:effectLst/>
+        </p:spPr>
+        <p:style>
+          <a:lnRef idx="1">
+            <a:schemeClr val="accent4"/>
+          </a:lnRef>
+          <a:fillRef idx="2">
+            <a:schemeClr val="accent4"/>
+          </a:fillRef>
+          <a:effectRef idx="1">
+            <a:schemeClr val="accent4"/>
+          </a:effectRef>
+          <a:fontRef idx="minor">
+            <a:schemeClr val="dk1"/>
+          </a:fontRef>
+        </p:style>
+        <p:txBody>
+          <a:bodyPr rtlCol="0" anchor="ctr"/>
+          <a:lstStyle/>
+          <a:p>
+            <a:pPr algn="ctr"/>
+            <a:r>
+              <a:rPr lang="en-US" sz="1050" dirty="0">
+                <a:solidFill>
+                  <a:srgbClr val="7030A0"/>
+                </a:solidFill>
+              </a:rPr>
+              <a:t>Remark</a:t>
+            </a:r>
+            <a:endParaRPr lang="en-SG" sz="1050" dirty="0">
+              <a:solidFill>
+                <a:srgbClr val="7030A0"/>
+              </a:solidFill>
+            </a:endParaRPr>
+          </a:p>
+        </p:txBody>
+      </p:sp>
+      <p:sp>
+        <p:nvSpPr>
+          <p:cNvPr id="73" name="Rectangle 8">
+            <a:extLst>
+              <a:ext uri="{FF2B5EF4-FFF2-40B4-BE49-F238E27FC236}">
+                <a16:creationId xmlns:a16="http://schemas.microsoft.com/office/drawing/2014/main" id="{90BF90B8-DFDA-41D3-88C8-82608A6EFF08}"/>
+              </a:ext>
+            </a:extLst>
+          </p:cNvPr>
+          <p:cNvSpPr/>
+          <p:nvPr/>
+        </p:nvSpPr>
+        <p:spPr>
+          <a:xfrm>
+            <a:off x="7231974" y="2620118"/>
+            <a:ext cx="708186" cy="285783"/>
+          </a:xfrm>
+          <a:prstGeom prst="rect">
+            <a:avLst/>
+          </a:prstGeom>
+          <a:ln w="19050">
+            <a:solidFill>
+              <a:srgbClr val="7030A0"/>
+            </a:solidFill>
+          </a:ln>
+          <a:effectLst/>
+        </p:spPr>
+        <p:style>
+          <a:lnRef idx="1">
+            <a:schemeClr val="accent4"/>
+          </a:lnRef>
+          <a:fillRef idx="2">
+            <a:schemeClr val="accent4"/>
+          </a:fillRef>
+          <a:effectRef idx="1">
+            <a:schemeClr val="accent4"/>
+          </a:effectRef>
+          <a:fontRef idx="minor">
+            <a:schemeClr val="dk1"/>
+          </a:fontRef>
+        </p:style>
+        <p:txBody>
+          <a:bodyPr rtlCol="0" anchor="ctr"/>
+          <a:lstStyle/>
+          <a:p>
+            <a:pPr algn="ctr"/>
+            <a:r>
+              <a:rPr lang="en-US" sz="1050" dirty="0">
+                <a:solidFill>
+                  <a:srgbClr val="7030A0"/>
+                </a:solidFill>
+              </a:rPr>
+              <a:t>Avatar</a:t>
+            </a:r>
+            <a:endParaRPr lang="en-SG" sz="1050" dirty="0">
+              <a:solidFill>
+                <a:srgbClr val="7030A0"/>
+              </a:solidFill>
+            </a:endParaRPr>
+          </a:p>
+        </p:txBody>
+      </p:sp>
+      <p:cxnSp>
+        <p:nvCxnSpPr>
+          <p:cNvPr id="74" name="Elbow Connector 83">
+            <a:extLst>
+              <a:ext uri="{FF2B5EF4-FFF2-40B4-BE49-F238E27FC236}">
+                <a16:creationId xmlns:a16="http://schemas.microsoft.com/office/drawing/2014/main" id="{81FD359E-DE47-48FC-8A03-9EDA4BA7CD23}"/>
+              </a:ext>
+            </a:extLst>
+          </p:cNvPr>
+          <p:cNvCxnSpPr>
+            <a:cxnSpLocks/>
+            <a:stCxn id="78" idx="3"/>
+            <a:endCxn id="73" idx="1"/>
+          </p:cNvCxnSpPr>
+          <p:nvPr/>
+        </p:nvCxnSpPr>
+        <p:spPr>
+          <a:xfrm>
+            <a:off x="6767729" y="1917291"/>
+            <a:ext cx="464245" cy="845719"/>
+          </a:xfrm>
+          <a:prstGeom prst="bentConnector3">
+            <a:avLst>
+              <a:gd name="adj1" fmla="val 50000"/>
+            </a:avLst>
+          </a:prstGeom>
+          <a:ln w="19050">
+            <a:solidFill>
+              <a:srgbClr val="7030A0"/>
+            </a:solidFill>
+            <a:headEnd type="none" w="med" len="med"/>
+            <a:tailEnd type="arrow" w="med" len="med"/>
+          </a:ln>
+          <a:effectLst/>
+        </p:spPr>
+        <p:style>
+          <a:lnRef idx="1">
+            <a:schemeClr val="accent2"/>
+          </a:lnRef>
+          <a:fillRef idx="2">
+            <a:schemeClr val="accent2"/>
+          </a:fillRef>
+          <a:effectRef idx="1">
+            <a:schemeClr val="accent2"/>
+          </a:effectRef>
+          <a:fontRef idx="minor">
+            <a:schemeClr val="dk1"/>
+          </a:fontRef>
+        </p:style>
+      </p:cxnSp>
+      <p:cxnSp>
+        <p:nvCxnSpPr>
+          <p:cNvPr id="77" name="Elbow Connector 83">
+            <a:extLst>
+              <a:ext uri="{FF2B5EF4-FFF2-40B4-BE49-F238E27FC236}">
+                <a16:creationId xmlns:a16="http://schemas.microsoft.com/office/drawing/2014/main" id="{4CC95B2F-ACE2-473F-8AA0-9D531EB32321}"/>
+              </a:ext>
+            </a:extLst>
+          </p:cNvPr>
+          <p:cNvCxnSpPr>
+            <a:cxnSpLocks/>
+            <a:stCxn id="78" idx="3"/>
+            <a:endCxn id="55" idx="1"/>
+          </p:cNvCxnSpPr>
+          <p:nvPr/>
+        </p:nvCxnSpPr>
+        <p:spPr>
+          <a:xfrm>
+            <a:off x="6767729" y="1917291"/>
+            <a:ext cx="464245" cy="524313"/>
+          </a:xfrm>
+          <a:prstGeom prst="bentConnector3">
+            <a:avLst>
+              <a:gd name="adj1" fmla="val 50000"/>
+            </a:avLst>
+          </a:prstGeom>
+          <a:ln w="19050">
+            <a:solidFill>
+              <a:srgbClr val="7030A0"/>
+            </a:solidFill>
+            <a:headEnd type="none" w="med" len="med"/>
+            <a:tailEnd type="arrow" w="med" len="med"/>
+          </a:ln>
+          <a:effectLst/>
+        </p:spPr>
+        <p:style>
+          <a:lnRef idx="1">
+            <a:schemeClr val="accent2"/>
+          </a:lnRef>
+          <a:fillRef idx="2">
+            <a:schemeClr val="accent2"/>
+          </a:fillRef>
+          <a:effectRef idx="1">
+            <a:schemeClr val="accent2"/>
+          </a:effectRef>
+          <a:fontRef idx="minor">
+            <a:schemeClr val="dk1"/>
+          </a:fontRef>
+        </p:style>
+      </p:cxnSp>
+      <p:sp>
+        <p:nvSpPr>
+          <p:cNvPr id="82" name="Rectangle 8">
+            <a:extLst>
+              <a:ext uri="{FF2B5EF4-FFF2-40B4-BE49-F238E27FC236}">
+                <a16:creationId xmlns:a16="http://schemas.microsoft.com/office/drawing/2014/main" id="{805154B8-62F0-4FB5-941E-C782FC6346DB}"/>
+              </a:ext>
+            </a:extLst>
+          </p:cNvPr>
+          <p:cNvSpPr/>
+          <p:nvPr/>
+        </p:nvSpPr>
+        <p:spPr>
+          <a:xfrm>
+            <a:off x="3976751" y="2247670"/>
+            <a:ext cx="1156969" cy="346760"/>
+          </a:xfrm>
+          <a:prstGeom prst="rect">
+            <a:avLst/>
+          </a:prstGeom>
+          <a:ln w="19050">
+            <a:solidFill>
+              <a:srgbClr val="7030A0"/>
+            </a:solidFill>
+          </a:ln>
+          <a:effectLst/>
+        </p:spPr>
+        <p:style>
+          <a:lnRef idx="1">
+            <a:schemeClr val="accent4"/>
+          </a:lnRef>
+          <a:fillRef idx="2">
+            <a:schemeClr val="accent4"/>
+          </a:fillRef>
+          <a:effectRef idx="1">
+            <a:schemeClr val="accent4"/>
+          </a:effectRef>
+          <a:fontRef idx="minor">
+            <a:schemeClr val="dk1"/>
+          </a:fontRef>
+        </p:style>
+        <p:txBody>
+          <a:bodyPr rtlCol="0" anchor="ctr"/>
+          <a:lstStyle/>
+          <a:p>
+            <a:pPr algn="ctr"/>
+            <a:r>
+              <a:rPr lang="en-US" sz="1050" dirty="0" err="1">
+                <a:solidFill>
+                  <a:srgbClr val="7030A0"/>
+                </a:solidFill>
+              </a:rPr>
+              <a:t>UniqueTaskList</a:t>
+            </a:r>
+            <a:endParaRPr lang="en-SG" sz="1050" dirty="0">
+              <a:solidFill>
+                <a:srgbClr val="7030A0"/>
+              </a:solidFill>
+            </a:endParaRPr>
+          </a:p>
+        </p:txBody>
+      </p:sp>
+      <p:cxnSp>
+        <p:nvCxnSpPr>
+          <p:cNvPr id="87" name="Elbow Connector 29">
+            <a:extLst>
+              <a:ext uri="{FF2B5EF4-FFF2-40B4-BE49-F238E27FC236}">
+                <a16:creationId xmlns:a16="http://schemas.microsoft.com/office/drawing/2014/main" id="{488DC759-68B0-4B8D-BF70-2FB37213EE5A}"/>
+              </a:ext>
+            </a:extLst>
+          </p:cNvPr>
+          <p:cNvCxnSpPr>
+            <a:cxnSpLocks/>
+            <a:stCxn id="51" idx="3"/>
+            <a:endCxn id="82" idx="1"/>
+          </p:cNvCxnSpPr>
+          <p:nvPr/>
+        </p:nvCxnSpPr>
+        <p:spPr>
+          <a:xfrm>
+            <a:off x="3710085" y="1643081"/>
+            <a:ext cx="266666" cy="777969"/>
+          </a:xfrm>
+          <a:prstGeom prst="bentConnector3">
+            <a:avLst/>
+          </a:prstGeom>
+          <a:ln w="19050">
+            <a:solidFill>
+              <a:srgbClr val="7030A0"/>
+            </a:solidFill>
+            <a:headEnd type="none" w="med" len="med"/>
+            <a:tailEnd type="arrow" w="med" len="med"/>
+          </a:ln>
+          <a:effectLst/>
+        </p:spPr>
+        <p:style>
+          <a:lnRef idx="1">
+            <a:schemeClr val="accent2"/>
+          </a:lnRef>
+          <a:fillRef idx="2">
+            <a:schemeClr val="accent2"/>
+          </a:fillRef>
+          <a:effectRef idx="1">
+            <a:schemeClr val="accent2"/>
+          </a:effectRef>
+          <a:fontRef idx="minor">
+            <a:schemeClr val="dk1"/>
+          </a:fontRef>
+        </p:style>
+      </p:cxnSp>
+      <p:sp>
+        <p:nvSpPr>
+          <p:cNvPr id="88" name="TextBox 87">
+            <a:extLst>
+              <a:ext uri="{FF2B5EF4-FFF2-40B4-BE49-F238E27FC236}">
+                <a16:creationId xmlns:a16="http://schemas.microsoft.com/office/drawing/2014/main" id="{E155516C-ECF7-453D-BECB-74D7077EAB12}"/>
+              </a:ext>
+            </a:extLst>
+          </p:cNvPr>
+          <p:cNvSpPr txBox="1"/>
+          <p:nvPr/>
+        </p:nvSpPr>
+        <p:spPr>
+          <a:xfrm>
+            <a:off x="3796834" y="2487628"/>
+            <a:ext cx="189257" cy="178683"/>
+          </a:xfrm>
+          <a:prstGeom prst="rect">
+            <a:avLst/>
+          </a:prstGeom>
+          <a:noFill/>
+        </p:spPr>
+        <p:txBody>
+          <a:bodyPr wrap="square" lIns="0" tIns="0" rIns="0" bIns="0" rtlCol="0">
+            <a:noAutofit/>
+          </a:bodyPr>
+          <a:lstStyle/>
+          <a:p>
+            <a:pPr algn="ctr"/>
+            <a:r>
+              <a:rPr lang="en-US" sz="1100" dirty="0">
+                <a:solidFill>
+                  <a:srgbClr val="7030A0"/>
+                </a:solidFill>
+              </a:rPr>
+              <a:t>1</a:t>
+            </a:r>
+            <a:endParaRPr lang="en-SG" sz="1100" dirty="0">
+              <a:solidFill>
+                <a:srgbClr val="7030A0"/>
+              </a:solidFill>
+            </a:endParaRPr>
+          </a:p>
+        </p:txBody>
+      </p:sp>
+      <p:sp>
+        <p:nvSpPr>
+          <p:cNvPr id="89" name="Flowchart: Decision 96">
+            <a:extLst>
+              <a:ext uri="{FF2B5EF4-FFF2-40B4-BE49-F238E27FC236}">
+                <a16:creationId xmlns:a16="http://schemas.microsoft.com/office/drawing/2014/main" id="{FC44E5F0-06A0-49A6-BBBD-31A822C03BF5}"/>
+              </a:ext>
+            </a:extLst>
+          </p:cNvPr>
+          <p:cNvSpPr/>
+          <p:nvPr/>
+        </p:nvSpPr>
+        <p:spPr>
+          <a:xfrm>
+            <a:off x="5153804" y="2368721"/>
+            <a:ext cx="236048" cy="173380"/>
+          </a:xfrm>
+          <a:prstGeom prst="flowChartDecision">
+            <a:avLst/>
+          </a:prstGeom>
+          <a:noFill/>
+          <a:ln w="19050">
+            <a:solidFill>
+              <a:srgbClr val="7030A0"/>
+            </a:solidFill>
+          </a:ln>
+          <a:effectLst/>
+        </p:spPr>
+        <p:style>
+          <a:lnRef idx="1">
+            <a:schemeClr val="accent6"/>
+          </a:lnRef>
+          <a:fillRef idx="2">
+            <a:schemeClr val="accent6"/>
+          </a:fillRef>
+          <a:effectRef idx="1">
+            <a:schemeClr val="accent6"/>
+          </a:effectRef>
+          <a:fontRef idx="minor">
+            <a:schemeClr val="dk1"/>
+          </a:fontRef>
+        </p:style>
+        <p:txBody>
+          <a:bodyPr rtlCol="0" anchor="ctr"/>
+          <a:lstStyle/>
+          <a:p>
+            <a:pPr algn="ctr"/>
+            <a:endParaRPr lang="en-US" sz="1050"/>
+          </a:p>
+        </p:txBody>
+      </p:sp>
+      <p:sp>
+        <p:nvSpPr>
+          <p:cNvPr id="95" name="Rectangle 8">
+            <a:extLst>
+              <a:ext uri="{FF2B5EF4-FFF2-40B4-BE49-F238E27FC236}">
+                <a16:creationId xmlns:a16="http://schemas.microsoft.com/office/drawing/2014/main" id="{A8D0382E-3C02-47F7-8616-F905FEE57578}"/>
+              </a:ext>
+            </a:extLst>
+          </p:cNvPr>
+          <p:cNvSpPr/>
+          <p:nvPr/>
+        </p:nvSpPr>
+        <p:spPr>
+          <a:xfrm>
+            <a:off x="5756570" y="2955955"/>
+            <a:ext cx="708186" cy="346760"/>
+          </a:xfrm>
+          <a:prstGeom prst="rect">
+            <a:avLst/>
+          </a:prstGeom>
+          <a:ln w="19050">
+            <a:solidFill>
+              <a:srgbClr val="7030A0"/>
+            </a:solidFill>
+          </a:ln>
+          <a:effectLst/>
+        </p:spPr>
+        <p:style>
+          <a:lnRef idx="1">
+            <a:schemeClr val="accent4"/>
+          </a:lnRef>
+          <a:fillRef idx="2">
+            <a:schemeClr val="accent4"/>
+          </a:fillRef>
+          <a:effectRef idx="1">
+            <a:schemeClr val="accent4"/>
+          </a:effectRef>
+          <a:fontRef idx="minor">
+            <a:schemeClr val="dk1"/>
+          </a:fontRef>
+        </p:style>
+        <p:txBody>
+          <a:bodyPr rtlCol="0" anchor="ctr"/>
+          <a:lstStyle/>
+          <a:p>
+            <a:pPr algn="ctr"/>
+            <a:r>
+              <a:rPr lang="en-US" sz="1050" dirty="0">
+                <a:solidFill>
+                  <a:srgbClr val="7030A0"/>
+                </a:solidFill>
+              </a:rPr>
+              <a:t>Task</a:t>
+            </a:r>
+            <a:endParaRPr lang="en-SG" sz="1050" dirty="0">
+              <a:solidFill>
+                <a:srgbClr val="7030A0"/>
+              </a:solidFill>
+            </a:endParaRPr>
+          </a:p>
+        </p:txBody>
+      </p:sp>
+      <p:cxnSp>
+        <p:nvCxnSpPr>
+          <p:cNvPr id="96" name="Elbow Connector 63">
+            <a:extLst>
+              <a:ext uri="{FF2B5EF4-FFF2-40B4-BE49-F238E27FC236}">
+                <a16:creationId xmlns:a16="http://schemas.microsoft.com/office/drawing/2014/main" id="{56BC1A22-A453-461D-925F-6015B1735EE1}"/>
+              </a:ext>
+            </a:extLst>
+          </p:cNvPr>
+          <p:cNvCxnSpPr>
+            <a:cxnSpLocks/>
+            <a:stCxn id="89" idx="3"/>
+            <a:endCxn id="95" idx="1"/>
+          </p:cNvCxnSpPr>
+          <p:nvPr/>
+        </p:nvCxnSpPr>
+        <p:spPr>
+          <a:xfrm>
+            <a:off x="5389852" y="2455411"/>
+            <a:ext cx="366718" cy="673924"/>
+          </a:xfrm>
+          <a:prstGeom prst="bentConnector3">
+            <a:avLst/>
+          </a:prstGeom>
+          <a:ln w="19050">
+            <a:solidFill>
+              <a:srgbClr val="7030A0"/>
+            </a:solidFill>
+            <a:headEnd type="none" w="med" len="med"/>
+            <a:tailEnd type="arrow" w="med" len="med"/>
+          </a:ln>
+          <a:effectLst/>
+        </p:spPr>
+        <p:style>
+          <a:lnRef idx="1">
+            <a:schemeClr val="accent2"/>
+          </a:lnRef>
+          <a:fillRef idx="2">
+            <a:schemeClr val="accent2"/>
+          </a:fillRef>
+          <a:effectRef idx="1">
+            <a:schemeClr val="accent2"/>
+          </a:effectRef>
+          <a:fontRef idx="minor">
+            <a:schemeClr val="dk1"/>
+          </a:fontRef>
+        </p:style>
+      </p:cxnSp>
+      <p:sp>
+        <p:nvSpPr>
+          <p:cNvPr id="101" name="TextBox 100">
+            <a:extLst>
+              <a:ext uri="{FF2B5EF4-FFF2-40B4-BE49-F238E27FC236}">
+                <a16:creationId xmlns:a16="http://schemas.microsoft.com/office/drawing/2014/main" id="{12A843B1-E840-486B-948B-E15F6569B794}"/>
+              </a:ext>
+            </a:extLst>
+          </p:cNvPr>
+          <p:cNvSpPr txBox="1"/>
+          <p:nvPr/>
+        </p:nvSpPr>
+        <p:spPr>
+          <a:xfrm>
+            <a:off x="5593808" y="3223460"/>
+            <a:ext cx="189257" cy="178683"/>
+          </a:xfrm>
+          <a:prstGeom prst="rect">
+            <a:avLst/>
+          </a:prstGeom>
+          <a:noFill/>
+        </p:spPr>
+        <p:txBody>
+          <a:bodyPr wrap="square" lIns="0" tIns="0" rIns="0" bIns="0" rtlCol="0">
+            <a:noAutofit/>
+          </a:bodyPr>
+          <a:lstStyle/>
+          <a:p>
+            <a:pPr algn="ctr"/>
+            <a:r>
+              <a:rPr lang="en-US" sz="1100" dirty="0">
+                <a:solidFill>
+                  <a:srgbClr val="7030A0"/>
+                </a:solidFill>
+              </a:rPr>
+              <a:t>*</a:t>
+            </a:r>
+            <a:endParaRPr lang="en-SG" sz="1100" dirty="0">
+              <a:solidFill>
+                <a:srgbClr val="7030A0"/>
+              </a:solidFill>
+            </a:endParaRPr>
+          </a:p>
+        </p:txBody>
+      </p:sp>
+      <p:cxnSp>
+        <p:nvCxnSpPr>
+          <p:cNvPr id="102" name="Elbow Connector 106">
+            <a:extLst>
+              <a:ext uri="{FF2B5EF4-FFF2-40B4-BE49-F238E27FC236}">
+                <a16:creationId xmlns:a16="http://schemas.microsoft.com/office/drawing/2014/main" id="{9B75DAFD-5A52-4174-9DE2-F5B8AD6C4AD6}"/>
+              </a:ext>
+            </a:extLst>
+          </p:cNvPr>
+          <p:cNvCxnSpPr>
+            <a:cxnSpLocks/>
+            <a:stCxn id="9" idx="1"/>
+            <a:endCxn id="95" idx="2"/>
+          </p:cNvCxnSpPr>
+          <p:nvPr/>
+        </p:nvCxnSpPr>
+        <p:spPr>
+          <a:xfrm rot="16200000" flipH="1">
+            <a:off x="3499874" y="691926"/>
+            <a:ext cx="831430" cy="4390148"/>
+          </a:xfrm>
+          <a:prstGeom prst="bentConnector3">
+            <a:avLst>
+              <a:gd name="adj1" fmla="val 127495"/>
+            </a:avLst>
+          </a:prstGeom>
+          <a:ln w="19050">
+            <a:solidFill>
+              <a:srgbClr val="7030A0"/>
+            </a:solidFill>
+            <a:prstDash val="solid"/>
+            <a:headEnd type="none" w="med" len="med"/>
+            <a:tailEnd type="arrow" w="med" len="med"/>
+          </a:ln>
+          <a:effectLst/>
+        </p:spPr>
+        <p:style>
+          <a:lnRef idx="1">
+            <a:schemeClr val="accent2"/>
+          </a:lnRef>
+          <a:fillRef idx="2">
+            <a:schemeClr val="accent2"/>
+          </a:fillRef>
+          <a:effectRef idx="1">
+            <a:schemeClr val="accent2"/>
+          </a:effectRef>
+          <a:fontRef idx="minor">
+            <a:schemeClr val="dk1"/>
+          </a:fontRef>
+        </p:style>
+      </p:cxnSp>
+      <p:sp>
+        <p:nvSpPr>
+          <p:cNvPr id="103" name="TextBox 102">
+            <a:extLst>
+              <a:ext uri="{FF2B5EF4-FFF2-40B4-BE49-F238E27FC236}">
+                <a16:creationId xmlns:a16="http://schemas.microsoft.com/office/drawing/2014/main" id="{A7951AB5-63A3-475A-BA90-7ADD08A3D1BF}"/>
+              </a:ext>
+            </a:extLst>
+          </p:cNvPr>
+          <p:cNvSpPr txBox="1"/>
+          <p:nvPr/>
+        </p:nvSpPr>
+        <p:spPr>
+          <a:xfrm>
+            <a:off x="5309539" y="3525130"/>
+            <a:ext cx="881018" cy="261610"/>
+          </a:xfrm>
+          <a:prstGeom prst="rect">
+            <a:avLst/>
+          </a:prstGeom>
+          <a:noFill/>
+        </p:spPr>
+        <p:txBody>
+          <a:bodyPr wrap="square" rtlCol="0">
+            <a:spAutoFit/>
+          </a:bodyPr>
+          <a:lstStyle/>
+          <a:p>
+            <a:pPr algn="r"/>
+            <a:r>
+              <a:rPr lang="en-US" sz="1100" dirty="0">
+                <a:solidFill>
+                  <a:srgbClr val="7030A0"/>
+                </a:solidFill>
+              </a:rPr>
+              <a:t>filtered list</a:t>
+            </a:r>
+            <a:endParaRPr lang="en-SG" sz="1100" dirty="0">
+              <a:solidFill>
+                <a:srgbClr val="7030A0"/>
+              </a:solidFill>
+            </a:endParaRPr>
+          </a:p>
+        </p:txBody>
+      </p:sp>
+      <p:sp>
+        <p:nvSpPr>
+          <p:cNvPr id="108" name="TextBox 107">
+            <a:extLst>
+              <a:ext uri="{FF2B5EF4-FFF2-40B4-BE49-F238E27FC236}">
+                <a16:creationId xmlns:a16="http://schemas.microsoft.com/office/drawing/2014/main" id="{3D0617AA-D925-40FC-868F-7510AE97CB31}"/>
+              </a:ext>
+            </a:extLst>
+          </p:cNvPr>
+          <p:cNvSpPr txBox="1"/>
+          <p:nvPr/>
+        </p:nvSpPr>
+        <p:spPr>
+          <a:xfrm>
+            <a:off x="5898211" y="3347646"/>
+            <a:ext cx="189257" cy="178683"/>
+          </a:xfrm>
+          <a:prstGeom prst="rect">
+            <a:avLst/>
+          </a:prstGeom>
+          <a:noFill/>
+        </p:spPr>
+        <p:txBody>
+          <a:bodyPr wrap="square" lIns="0" tIns="0" rIns="0" bIns="0" rtlCol="0">
+            <a:noAutofit/>
+          </a:bodyPr>
+          <a:lstStyle/>
+          <a:p>
+            <a:pPr algn="ctr"/>
+            <a:r>
+              <a:rPr lang="en-US" sz="1100" dirty="0">
+                <a:solidFill>
+                  <a:srgbClr val="7030A0"/>
+                </a:solidFill>
+              </a:rPr>
+              <a:t>1</a:t>
+            </a:r>
+            <a:endParaRPr lang="en-SG" sz="1100" dirty="0">
+              <a:solidFill>
+                <a:srgbClr val="7030A0"/>
+              </a:solidFill>
+            </a:endParaRPr>
+          </a:p>
+        </p:txBody>
+      </p:sp>
+      <p:sp>
+        <p:nvSpPr>
+          <p:cNvPr id="109" name="Flowchart: Decision 96">
+            <a:extLst>
+              <a:ext uri="{FF2B5EF4-FFF2-40B4-BE49-F238E27FC236}">
+                <a16:creationId xmlns:a16="http://schemas.microsoft.com/office/drawing/2014/main" id="{E88614BA-4BD4-4A65-B9BE-5D80B0E3E6C4}"/>
+              </a:ext>
+            </a:extLst>
+          </p:cNvPr>
+          <p:cNvSpPr/>
+          <p:nvPr/>
+        </p:nvSpPr>
+        <p:spPr>
+          <a:xfrm>
+            <a:off x="6464756" y="3040019"/>
+            <a:ext cx="236048" cy="173380"/>
+          </a:xfrm>
+          <a:prstGeom prst="flowChartDecision">
+            <a:avLst/>
+          </a:prstGeom>
+          <a:solidFill>
+            <a:srgbClr val="7030A0"/>
+          </a:solidFill>
+          <a:ln w="19050">
+            <a:solidFill>
+              <a:srgbClr val="7030A0"/>
+            </a:solidFill>
+          </a:ln>
+          <a:effectLst/>
+        </p:spPr>
+        <p:style>
+          <a:lnRef idx="1">
+            <a:schemeClr val="accent6"/>
+          </a:lnRef>
+          <a:fillRef idx="2">
+            <a:schemeClr val="accent6"/>
+          </a:fillRef>
+          <a:effectRef idx="1">
+            <a:schemeClr val="accent6"/>
+          </a:effectRef>
+          <a:fontRef idx="minor">
+            <a:schemeClr val="dk1"/>
+          </a:fontRef>
+        </p:style>
+        <p:txBody>
+          <a:bodyPr rtlCol="0" anchor="ctr"/>
+          <a:lstStyle/>
+          <a:p>
+            <a:pPr algn="ctr"/>
+            <a:endParaRPr lang="en-US" sz="1050"/>
+          </a:p>
+        </p:txBody>
+      </p:sp>
+      <p:sp>
+        <p:nvSpPr>
+          <p:cNvPr id="117" name="Rectangle 8">
+            <a:extLst>
+              <a:ext uri="{FF2B5EF4-FFF2-40B4-BE49-F238E27FC236}">
+                <a16:creationId xmlns:a16="http://schemas.microsoft.com/office/drawing/2014/main" id="{0FFD266F-24E0-4AA6-8EE9-F043A4E5AE46}"/>
+              </a:ext>
+            </a:extLst>
+          </p:cNvPr>
+          <p:cNvSpPr/>
+          <p:nvPr/>
+        </p:nvSpPr>
+        <p:spPr>
+          <a:xfrm>
+            <a:off x="7231974" y="3023127"/>
+            <a:ext cx="708186" cy="285783"/>
+          </a:xfrm>
+          <a:prstGeom prst="rect">
+            <a:avLst/>
+          </a:prstGeom>
+          <a:ln w="19050">
+            <a:solidFill>
+              <a:srgbClr val="7030A0"/>
+            </a:solidFill>
+          </a:ln>
+          <a:effectLst/>
+        </p:spPr>
+        <p:style>
+          <a:lnRef idx="1">
+            <a:schemeClr val="accent4"/>
+          </a:lnRef>
+          <a:fillRef idx="2">
+            <a:schemeClr val="accent4"/>
+          </a:fillRef>
+          <a:effectRef idx="1">
+            <a:schemeClr val="accent4"/>
+          </a:effectRef>
+          <a:fontRef idx="minor">
+            <a:schemeClr val="dk1"/>
+          </a:fontRef>
+        </p:style>
+        <p:txBody>
+          <a:bodyPr rtlCol="0" anchor="ctr"/>
+          <a:lstStyle/>
+          <a:p>
+            <a:pPr algn="ctr"/>
+            <a:r>
+              <a:rPr lang="en-US" sz="900" dirty="0" err="1">
+                <a:solidFill>
+                  <a:srgbClr val="7030A0"/>
+                </a:solidFill>
+              </a:rPr>
+              <a:t>TaskName</a:t>
+            </a:r>
+            <a:endParaRPr lang="en-SG" sz="900" dirty="0">
+              <a:solidFill>
+                <a:srgbClr val="7030A0"/>
+              </a:solidFill>
+            </a:endParaRPr>
+          </a:p>
+        </p:txBody>
+      </p:sp>
+      <p:sp>
+        <p:nvSpPr>
+          <p:cNvPr id="121" name="Rectangle 8">
+            <a:extLst>
+              <a:ext uri="{FF2B5EF4-FFF2-40B4-BE49-F238E27FC236}">
+                <a16:creationId xmlns:a16="http://schemas.microsoft.com/office/drawing/2014/main" id="{6EEC3476-EB66-4250-9D60-221DE5DCE039}"/>
+              </a:ext>
+            </a:extLst>
+          </p:cNvPr>
+          <p:cNvSpPr/>
+          <p:nvPr/>
+        </p:nvSpPr>
+        <p:spPr>
+          <a:xfrm>
+            <a:off x="7231974" y="3346105"/>
+            <a:ext cx="708186" cy="285783"/>
+          </a:xfrm>
+          <a:prstGeom prst="rect">
+            <a:avLst/>
+          </a:prstGeom>
+          <a:ln w="19050">
+            <a:solidFill>
+              <a:srgbClr val="7030A0"/>
+            </a:solidFill>
+          </a:ln>
+          <a:effectLst/>
+        </p:spPr>
+        <p:style>
+          <a:lnRef idx="1">
+            <a:schemeClr val="accent4"/>
+          </a:lnRef>
+          <a:fillRef idx="2">
+            <a:schemeClr val="accent4"/>
+          </a:fillRef>
+          <a:effectRef idx="1">
+            <a:schemeClr val="accent4"/>
+          </a:effectRef>
+          <a:fontRef idx="minor">
+            <a:schemeClr val="dk1"/>
+          </a:fontRef>
+        </p:style>
+        <p:txBody>
+          <a:bodyPr rtlCol="0" anchor="ctr"/>
+          <a:lstStyle/>
+          <a:p>
+            <a:pPr algn="ctr"/>
+            <a:r>
+              <a:rPr lang="en-US" sz="800" dirty="0">
+                <a:solidFill>
+                  <a:srgbClr val="7030A0"/>
+                </a:solidFill>
+              </a:rPr>
+              <a:t>Description</a:t>
+            </a:r>
+            <a:endParaRPr lang="en-SG" sz="800" dirty="0">
+              <a:solidFill>
+                <a:srgbClr val="7030A0"/>
+              </a:solidFill>
+            </a:endParaRPr>
+          </a:p>
+        </p:txBody>
+      </p:sp>
+      <p:sp>
+        <p:nvSpPr>
+          <p:cNvPr id="123" name="Rectangle 8">
+            <a:extLst>
+              <a:ext uri="{FF2B5EF4-FFF2-40B4-BE49-F238E27FC236}">
+                <a16:creationId xmlns:a16="http://schemas.microsoft.com/office/drawing/2014/main" id="{0E2A31D9-9AD6-453A-A9C5-CE5FBF115BC6}"/>
+              </a:ext>
+            </a:extLst>
+          </p:cNvPr>
+          <p:cNvSpPr/>
+          <p:nvPr/>
+        </p:nvSpPr>
+        <p:spPr>
+          <a:xfrm>
+            <a:off x="7231974" y="3669083"/>
+            <a:ext cx="708186" cy="285783"/>
+          </a:xfrm>
+          <a:prstGeom prst="rect">
+            <a:avLst/>
+          </a:prstGeom>
+          <a:ln w="19050">
+            <a:solidFill>
+              <a:srgbClr val="7030A0"/>
+            </a:solidFill>
+          </a:ln>
+          <a:effectLst/>
+        </p:spPr>
+        <p:style>
+          <a:lnRef idx="1">
+            <a:schemeClr val="accent4"/>
+          </a:lnRef>
+          <a:fillRef idx="2">
+            <a:schemeClr val="accent4"/>
+          </a:fillRef>
+          <a:effectRef idx="1">
+            <a:schemeClr val="accent4"/>
+          </a:effectRef>
+          <a:fontRef idx="minor">
+            <a:schemeClr val="dk1"/>
+          </a:fontRef>
+        </p:style>
+        <p:txBody>
+          <a:bodyPr rtlCol="0" anchor="ctr"/>
+          <a:lstStyle/>
+          <a:p>
+            <a:pPr algn="ctr"/>
+            <a:r>
+              <a:rPr lang="en-US" sz="1050" dirty="0">
+                <a:solidFill>
+                  <a:srgbClr val="7030A0"/>
+                </a:solidFill>
+              </a:rPr>
+              <a:t>Deadline</a:t>
+            </a:r>
+            <a:endParaRPr lang="en-SG" sz="1050" dirty="0">
+              <a:solidFill>
+                <a:srgbClr val="7030A0"/>
+              </a:solidFill>
+            </a:endParaRPr>
+          </a:p>
+        </p:txBody>
+      </p:sp>
+      <p:sp>
+        <p:nvSpPr>
+          <p:cNvPr id="125" name="Rectangle 8">
+            <a:extLst>
+              <a:ext uri="{FF2B5EF4-FFF2-40B4-BE49-F238E27FC236}">
+                <a16:creationId xmlns:a16="http://schemas.microsoft.com/office/drawing/2014/main" id="{99200409-F228-4FA2-B830-1D9158D14560}"/>
+              </a:ext>
+            </a:extLst>
+          </p:cNvPr>
+          <p:cNvSpPr/>
+          <p:nvPr/>
+        </p:nvSpPr>
+        <p:spPr>
+          <a:xfrm>
+            <a:off x="7231974" y="3992060"/>
+            <a:ext cx="708186" cy="285783"/>
+          </a:xfrm>
+          <a:prstGeom prst="rect">
+            <a:avLst/>
+          </a:prstGeom>
+          <a:ln w="19050">
+            <a:solidFill>
+              <a:srgbClr val="7030A0"/>
+            </a:solidFill>
+          </a:ln>
+          <a:effectLst/>
+        </p:spPr>
+        <p:style>
+          <a:lnRef idx="1">
+            <a:schemeClr val="accent4"/>
+          </a:lnRef>
+          <a:fillRef idx="2">
+            <a:schemeClr val="accent4"/>
+          </a:fillRef>
+          <a:effectRef idx="1">
+            <a:schemeClr val="accent4"/>
+          </a:effectRef>
+          <a:fontRef idx="minor">
+            <a:schemeClr val="dk1"/>
+          </a:fontRef>
+        </p:style>
+        <p:txBody>
+          <a:bodyPr rtlCol="0" anchor="ctr"/>
+          <a:lstStyle/>
+          <a:p>
+            <a:pPr algn="ctr"/>
+            <a:r>
+              <a:rPr lang="en-US" sz="800" dirty="0" err="1">
+                <a:solidFill>
+                  <a:srgbClr val="7030A0"/>
+                </a:solidFill>
+              </a:rPr>
+              <a:t>TaskAddress</a:t>
+            </a:r>
+            <a:endParaRPr lang="en-SG" sz="800" dirty="0">
+              <a:solidFill>
+                <a:srgbClr val="7030A0"/>
+              </a:solidFill>
+            </a:endParaRPr>
+          </a:p>
+        </p:txBody>
+      </p:sp>
+      <p:sp>
+        <p:nvSpPr>
+          <p:cNvPr id="126" name="Rectangle 8">
+            <a:extLst>
+              <a:ext uri="{FF2B5EF4-FFF2-40B4-BE49-F238E27FC236}">
+                <a16:creationId xmlns:a16="http://schemas.microsoft.com/office/drawing/2014/main" id="{281FD0B8-941B-47D4-95EC-AF3CE549D3D0}"/>
+              </a:ext>
+            </a:extLst>
+          </p:cNvPr>
+          <p:cNvSpPr/>
+          <p:nvPr/>
+        </p:nvSpPr>
+        <p:spPr>
+          <a:xfrm>
+            <a:off x="7231974" y="4313717"/>
+            <a:ext cx="708186" cy="285783"/>
+          </a:xfrm>
+          <a:prstGeom prst="rect">
+            <a:avLst/>
+          </a:prstGeom>
+          <a:ln w="19050">
+            <a:solidFill>
+              <a:srgbClr val="7030A0"/>
+            </a:solidFill>
+          </a:ln>
+          <a:effectLst/>
+        </p:spPr>
+        <p:style>
+          <a:lnRef idx="1">
+            <a:schemeClr val="accent4"/>
+          </a:lnRef>
+          <a:fillRef idx="2">
+            <a:schemeClr val="accent4"/>
+          </a:fillRef>
+          <a:effectRef idx="1">
+            <a:schemeClr val="accent4"/>
+          </a:effectRef>
+          <a:fontRef idx="minor">
+            <a:schemeClr val="dk1"/>
+          </a:fontRef>
+        </p:style>
+        <p:txBody>
+          <a:bodyPr rtlCol="0" anchor="ctr"/>
+          <a:lstStyle/>
+          <a:p>
+            <a:pPr algn="ctr"/>
+            <a:r>
+              <a:rPr lang="en-US" sz="1050" dirty="0">
+                <a:solidFill>
+                  <a:srgbClr val="7030A0"/>
+                </a:solidFill>
+              </a:rPr>
+              <a:t>Priority</a:t>
+            </a:r>
+            <a:endParaRPr lang="en-SG" sz="1050" dirty="0">
+              <a:solidFill>
+                <a:srgbClr val="7030A0"/>
+              </a:solidFill>
+            </a:endParaRPr>
+          </a:p>
+        </p:txBody>
+      </p:sp>
+      <p:sp>
+        <p:nvSpPr>
+          <p:cNvPr id="127" name="Rectangle 8">
+            <a:extLst>
+              <a:ext uri="{FF2B5EF4-FFF2-40B4-BE49-F238E27FC236}">
+                <a16:creationId xmlns:a16="http://schemas.microsoft.com/office/drawing/2014/main" id="{A454CF6C-A182-4B40-B1D1-963377757A97}"/>
+              </a:ext>
+            </a:extLst>
+          </p:cNvPr>
+          <p:cNvSpPr/>
+          <p:nvPr/>
+        </p:nvSpPr>
+        <p:spPr>
+          <a:xfrm>
+            <a:off x="7231974" y="4635123"/>
+            <a:ext cx="708186" cy="285783"/>
+          </a:xfrm>
+          <a:prstGeom prst="rect">
+            <a:avLst/>
+          </a:prstGeom>
+          <a:ln w="19050">
+            <a:solidFill>
+              <a:srgbClr val="7030A0"/>
+            </a:solidFill>
+          </a:ln>
+          <a:effectLst/>
+        </p:spPr>
+        <p:style>
+          <a:lnRef idx="1">
+            <a:schemeClr val="accent4"/>
+          </a:lnRef>
+          <a:fillRef idx="2">
+            <a:schemeClr val="accent4"/>
+          </a:fillRef>
+          <a:effectRef idx="1">
+            <a:schemeClr val="accent4"/>
+          </a:effectRef>
+          <a:fontRef idx="minor">
+            <a:schemeClr val="dk1"/>
+          </a:fontRef>
+        </p:style>
+        <p:txBody>
+          <a:bodyPr rtlCol="0" anchor="ctr"/>
+          <a:lstStyle/>
+          <a:p>
+            <a:pPr algn="ctr"/>
+            <a:r>
+              <a:rPr lang="en-US" sz="1000" dirty="0">
+                <a:solidFill>
+                  <a:srgbClr val="7030A0"/>
+                </a:solidFill>
+              </a:rPr>
+              <a:t>Assignees</a:t>
+            </a:r>
+            <a:endParaRPr lang="en-SG" sz="1000" dirty="0">
+              <a:solidFill>
+                <a:srgbClr val="7030A0"/>
+              </a:solidFill>
+            </a:endParaRPr>
+          </a:p>
+        </p:txBody>
+      </p:sp>
+      <p:cxnSp>
+        <p:nvCxnSpPr>
+          <p:cNvPr id="128" name="Elbow Connector 83">
+            <a:extLst>
+              <a:ext uri="{FF2B5EF4-FFF2-40B4-BE49-F238E27FC236}">
+                <a16:creationId xmlns:a16="http://schemas.microsoft.com/office/drawing/2014/main" id="{F0EEAB57-C64C-42A5-8836-DBDABE03C277}"/>
+              </a:ext>
+            </a:extLst>
+          </p:cNvPr>
+          <p:cNvCxnSpPr>
+            <a:cxnSpLocks/>
+            <a:stCxn id="109" idx="3"/>
+            <a:endCxn id="117" idx="1"/>
+          </p:cNvCxnSpPr>
+          <p:nvPr/>
+        </p:nvCxnSpPr>
+        <p:spPr>
+          <a:xfrm>
+            <a:off x="6700804" y="3126709"/>
+            <a:ext cx="531170" cy="39310"/>
+          </a:xfrm>
+          <a:prstGeom prst="bentConnector3">
+            <a:avLst>
+              <a:gd name="adj1" fmla="val 50000"/>
+            </a:avLst>
+          </a:prstGeom>
+          <a:ln w="19050">
+            <a:solidFill>
+              <a:srgbClr val="7030A0"/>
+            </a:solidFill>
+            <a:headEnd type="none" w="med" len="med"/>
+            <a:tailEnd type="arrow" w="med" len="med"/>
+          </a:ln>
+          <a:effectLst/>
+        </p:spPr>
+        <p:style>
+          <a:lnRef idx="1">
+            <a:schemeClr val="accent2"/>
+          </a:lnRef>
+          <a:fillRef idx="2">
+            <a:schemeClr val="accent2"/>
+          </a:fillRef>
+          <a:effectRef idx="1">
+            <a:schemeClr val="accent2"/>
+          </a:effectRef>
+          <a:fontRef idx="minor">
+            <a:schemeClr val="dk1"/>
+          </a:fontRef>
+        </p:style>
+      </p:cxnSp>
+      <p:cxnSp>
+        <p:nvCxnSpPr>
+          <p:cNvPr id="129" name="Elbow Connector 83">
+            <a:extLst>
+              <a:ext uri="{FF2B5EF4-FFF2-40B4-BE49-F238E27FC236}">
+                <a16:creationId xmlns:a16="http://schemas.microsoft.com/office/drawing/2014/main" id="{C2FE6C31-C083-44C0-A3D6-02F48CF07015}"/>
+              </a:ext>
+            </a:extLst>
+          </p:cNvPr>
+          <p:cNvCxnSpPr>
+            <a:cxnSpLocks/>
+            <a:stCxn id="109" idx="3"/>
+            <a:endCxn id="126" idx="1"/>
+          </p:cNvCxnSpPr>
+          <p:nvPr/>
+        </p:nvCxnSpPr>
+        <p:spPr>
+          <a:xfrm>
+            <a:off x="6700804" y="3126709"/>
+            <a:ext cx="531170" cy="1329900"/>
+          </a:xfrm>
+          <a:prstGeom prst="bentConnector3">
+            <a:avLst>
+              <a:gd name="adj1" fmla="val 50000"/>
+            </a:avLst>
+          </a:prstGeom>
+          <a:ln w="19050">
+            <a:solidFill>
+              <a:srgbClr val="7030A0"/>
+            </a:solidFill>
+            <a:headEnd type="none" w="med" len="med"/>
+            <a:tailEnd type="arrow" w="med" len="med"/>
+          </a:ln>
+          <a:effectLst/>
+        </p:spPr>
+        <p:style>
+          <a:lnRef idx="1">
+            <a:schemeClr val="accent2"/>
+          </a:lnRef>
+          <a:fillRef idx="2">
+            <a:schemeClr val="accent2"/>
+          </a:fillRef>
+          <a:effectRef idx="1">
+            <a:schemeClr val="accent2"/>
+          </a:effectRef>
+          <a:fontRef idx="minor">
+            <a:schemeClr val="dk1"/>
+          </a:fontRef>
+        </p:style>
+      </p:cxnSp>
+      <p:cxnSp>
+        <p:nvCxnSpPr>
+          <p:cNvPr id="130" name="Elbow Connector 83">
+            <a:extLst>
+              <a:ext uri="{FF2B5EF4-FFF2-40B4-BE49-F238E27FC236}">
+                <a16:creationId xmlns:a16="http://schemas.microsoft.com/office/drawing/2014/main" id="{B0342F09-E7EC-4EF7-8E18-B618382EC746}"/>
+              </a:ext>
+            </a:extLst>
+          </p:cNvPr>
+          <p:cNvCxnSpPr>
+            <a:cxnSpLocks/>
+            <a:stCxn id="109" idx="3"/>
+            <a:endCxn id="121" idx="1"/>
+          </p:cNvCxnSpPr>
+          <p:nvPr/>
+        </p:nvCxnSpPr>
+        <p:spPr>
+          <a:xfrm>
+            <a:off x="6700804" y="3126709"/>
+            <a:ext cx="531170" cy="362288"/>
+          </a:xfrm>
+          <a:prstGeom prst="bentConnector3">
+            <a:avLst>
+              <a:gd name="adj1" fmla="val 50000"/>
+            </a:avLst>
+          </a:prstGeom>
+          <a:ln w="19050">
+            <a:solidFill>
+              <a:srgbClr val="7030A0"/>
+            </a:solidFill>
+            <a:headEnd type="none" w="med" len="med"/>
+            <a:tailEnd type="arrow" w="med" len="med"/>
+          </a:ln>
+          <a:effectLst/>
+        </p:spPr>
+        <p:style>
+          <a:lnRef idx="1">
+            <a:schemeClr val="accent2"/>
+          </a:lnRef>
+          <a:fillRef idx="2">
+            <a:schemeClr val="accent2"/>
+          </a:fillRef>
+          <a:effectRef idx="1">
+            <a:schemeClr val="accent2"/>
+          </a:effectRef>
+          <a:fontRef idx="minor">
+            <a:schemeClr val="dk1"/>
+          </a:fontRef>
+        </p:style>
+      </p:cxnSp>
+      <p:cxnSp>
+        <p:nvCxnSpPr>
+          <p:cNvPr id="131" name="Elbow Connector 83">
+            <a:extLst>
+              <a:ext uri="{FF2B5EF4-FFF2-40B4-BE49-F238E27FC236}">
+                <a16:creationId xmlns:a16="http://schemas.microsoft.com/office/drawing/2014/main" id="{9A849DA5-C09B-496C-A63A-B1FE6A3CF4C6}"/>
+              </a:ext>
+            </a:extLst>
+          </p:cNvPr>
+          <p:cNvCxnSpPr>
+            <a:cxnSpLocks/>
+            <a:stCxn id="109" idx="3"/>
+            <a:endCxn id="123" idx="1"/>
+          </p:cNvCxnSpPr>
+          <p:nvPr/>
+        </p:nvCxnSpPr>
+        <p:spPr>
+          <a:xfrm>
+            <a:off x="6700804" y="3126709"/>
+            <a:ext cx="531170" cy="685266"/>
+          </a:xfrm>
+          <a:prstGeom prst="bentConnector3">
+            <a:avLst>
+              <a:gd name="adj1" fmla="val 50000"/>
+            </a:avLst>
+          </a:prstGeom>
+          <a:ln w="19050">
+            <a:solidFill>
+              <a:srgbClr val="7030A0"/>
+            </a:solidFill>
+            <a:headEnd type="none" w="med" len="med"/>
+            <a:tailEnd type="arrow" w="med" len="med"/>
+          </a:ln>
+          <a:effectLst/>
+        </p:spPr>
+        <p:style>
+          <a:lnRef idx="1">
+            <a:schemeClr val="accent2"/>
+          </a:lnRef>
+          <a:fillRef idx="2">
+            <a:schemeClr val="accent2"/>
+          </a:fillRef>
+          <a:effectRef idx="1">
+            <a:schemeClr val="accent2"/>
+          </a:effectRef>
+          <a:fontRef idx="minor">
+            <a:schemeClr val="dk1"/>
+          </a:fontRef>
+        </p:style>
+      </p:cxnSp>
+      <p:cxnSp>
+        <p:nvCxnSpPr>
+          <p:cNvPr id="134" name="Elbow Connector 83">
+            <a:extLst>
+              <a:ext uri="{FF2B5EF4-FFF2-40B4-BE49-F238E27FC236}">
+                <a16:creationId xmlns:a16="http://schemas.microsoft.com/office/drawing/2014/main" id="{69B1E059-D7E5-4EB2-BC9A-E4FD453604AE}"/>
+              </a:ext>
+            </a:extLst>
+          </p:cNvPr>
+          <p:cNvCxnSpPr>
+            <a:cxnSpLocks/>
+            <a:stCxn id="109" idx="3"/>
+            <a:endCxn id="125" idx="1"/>
+          </p:cNvCxnSpPr>
+          <p:nvPr/>
+        </p:nvCxnSpPr>
+        <p:spPr>
+          <a:xfrm>
+            <a:off x="6700804" y="3126709"/>
+            <a:ext cx="531170" cy="1008243"/>
+          </a:xfrm>
+          <a:prstGeom prst="bentConnector3">
+            <a:avLst>
+              <a:gd name="adj1" fmla="val 50000"/>
+            </a:avLst>
+          </a:prstGeom>
+          <a:ln w="19050">
+            <a:solidFill>
+              <a:srgbClr val="7030A0"/>
+            </a:solidFill>
+            <a:headEnd type="none" w="med" len="med"/>
+            <a:tailEnd type="arrow" w="med" len="med"/>
+          </a:ln>
+          <a:effectLst/>
+        </p:spPr>
+        <p:style>
+          <a:lnRef idx="1">
+            <a:schemeClr val="accent2"/>
+          </a:lnRef>
+          <a:fillRef idx="2">
+            <a:schemeClr val="accent2"/>
+          </a:fillRef>
+          <a:effectRef idx="1">
+            <a:schemeClr val="accent2"/>
+          </a:effectRef>
+          <a:fontRef idx="minor">
+            <a:schemeClr val="dk1"/>
+          </a:fontRef>
+        </p:style>
+      </p:cxnSp>
+      <p:cxnSp>
+        <p:nvCxnSpPr>
+          <p:cNvPr id="139" name="Elbow Connector 83">
+            <a:extLst>
+              <a:ext uri="{FF2B5EF4-FFF2-40B4-BE49-F238E27FC236}">
+                <a16:creationId xmlns:a16="http://schemas.microsoft.com/office/drawing/2014/main" id="{775501FA-4167-454C-87C3-76BCE6A15D8B}"/>
+              </a:ext>
+            </a:extLst>
+          </p:cNvPr>
+          <p:cNvCxnSpPr>
+            <a:cxnSpLocks/>
+            <a:stCxn id="109" idx="3"/>
+            <a:endCxn id="127" idx="1"/>
+          </p:cNvCxnSpPr>
+          <p:nvPr/>
+        </p:nvCxnSpPr>
+        <p:spPr>
+          <a:xfrm>
+            <a:off x="6700804" y="3126709"/>
+            <a:ext cx="531170" cy="1651306"/>
+          </a:xfrm>
+          <a:prstGeom prst="bentConnector3">
+            <a:avLst>
+              <a:gd name="adj1" fmla="val 50000"/>
+            </a:avLst>
+          </a:prstGeom>
+          <a:ln w="19050">
+            <a:solidFill>
+              <a:srgbClr val="7030A0"/>
+            </a:solidFill>
+            <a:headEnd type="none" w="med" len="med"/>
+            <a:tailEnd type="arrow" w="med" len="med"/>
+          </a:ln>
+          <a:effectLst/>
+        </p:spPr>
+        <p:style>
+          <a:lnRef idx="1">
+            <a:schemeClr val="accent2"/>
+          </a:lnRef>
+          <a:fillRef idx="2">
+            <a:schemeClr val="accent2"/>
+          </a:fillRef>
+          <a:effectRef idx="1">
+            <a:schemeClr val="accent2"/>
+          </a:effectRef>
+          <a:fontRef idx="minor">
+            <a:schemeClr val="dk1"/>
+          </a:fontRef>
+        </p:style>
+      </p:cxnSp>
+      <p:sp>
+        <p:nvSpPr>
+          <p:cNvPr id="142" name="Rectangle 8">
+            <a:extLst>
+              <a:ext uri="{FF2B5EF4-FFF2-40B4-BE49-F238E27FC236}">
+                <a16:creationId xmlns:a16="http://schemas.microsoft.com/office/drawing/2014/main" id="{B164FAE0-79BC-45C0-8674-1CBB4BA05CE7}"/>
+              </a:ext>
+            </a:extLst>
+          </p:cNvPr>
+          <p:cNvSpPr/>
+          <p:nvPr/>
+        </p:nvSpPr>
+        <p:spPr>
+          <a:xfrm>
+            <a:off x="5389852" y="4010354"/>
+            <a:ext cx="1156969" cy="346760"/>
+          </a:xfrm>
+          <a:prstGeom prst="rect">
+            <a:avLst/>
+          </a:prstGeom>
+          <a:ln w="19050">
+            <a:solidFill>
+              <a:srgbClr val="7030A0"/>
+            </a:solidFill>
+          </a:ln>
+          <a:effectLst/>
+        </p:spPr>
+        <p:style>
+          <a:lnRef idx="1">
+            <a:schemeClr val="accent4"/>
+          </a:lnRef>
+          <a:fillRef idx="2">
+            <a:schemeClr val="accent4"/>
+          </a:fillRef>
+          <a:effectRef idx="1">
+            <a:schemeClr val="accent4"/>
+          </a:effectRef>
+          <a:fontRef idx="minor">
+            <a:schemeClr val="dk1"/>
+          </a:fontRef>
+        </p:style>
+        <p:txBody>
+          <a:bodyPr rtlCol="0" anchor="ctr"/>
+          <a:lstStyle/>
+          <a:p>
+            <a:pPr algn="ctr"/>
+            <a:r>
+              <a:rPr lang="en-US" sz="1050" dirty="0">
+                <a:solidFill>
+                  <a:srgbClr val="7030A0"/>
+                </a:solidFill>
+              </a:rPr>
+              <a:t>&lt;&lt;interface&gt;&gt;</a:t>
+            </a:r>
+            <a:br>
+              <a:rPr lang="en-US" sz="1050" dirty="0">
+                <a:solidFill>
+                  <a:srgbClr val="7030A0"/>
+                </a:solidFill>
+              </a:rPr>
+            </a:br>
+            <a:r>
+              <a:rPr lang="en-US" sz="1050" dirty="0" err="1">
+                <a:solidFill>
+                  <a:srgbClr val="7030A0"/>
+                </a:solidFill>
+              </a:rPr>
+              <a:t>ReadOnlyTask</a:t>
+            </a:r>
+            <a:endParaRPr lang="en-SG" sz="1050" dirty="0">
+              <a:solidFill>
+                <a:srgbClr val="7030A0"/>
+              </a:solidFill>
+            </a:endParaRPr>
+          </a:p>
+        </p:txBody>
+      </p:sp>
+      <p:sp>
+        <p:nvSpPr>
+          <p:cNvPr id="143" name="Isosceles Triangle 102">
+            <a:extLst>
+              <a:ext uri="{FF2B5EF4-FFF2-40B4-BE49-F238E27FC236}">
+                <a16:creationId xmlns:a16="http://schemas.microsoft.com/office/drawing/2014/main" id="{64BFBA15-4AE5-4E80-BB95-2922DEB74B78}"/>
+              </a:ext>
+            </a:extLst>
+          </p:cNvPr>
+          <p:cNvSpPr/>
+          <p:nvPr/>
+        </p:nvSpPr>
+        <p:spPr>
+          <a:xfrm flipV="1">
+            <a:off x="6297489" y="3828537"/>
+            <a:ext cx="270504" cy="175523"/>
+          </a:xfrm>
+          <a:prstGeom prst="triangle">
+            <a:avLst/>
+          </a:prstGeom>
+          <a:solidFill>
+            <a:srgbClr val="7030A0"/>
+          </a:solidFill>
+          <a:ln w="19050">
+            <a:solidFill>
+              <a:srgbClr val="7030A0"/>
+            </a:solidFill>
+          </a:ln>
+          <a:effectLst/>
+        </p:spPr>
+        <p:style>
+          <a:lnRef idx="1">
+            <a:schemeClr val="accent4"/>
+          </a:lnRef>
+          <a:fillRef idx="2">
+            <a:schemeClr val="accent4"/>
+          </a:fillRef>
+          <a:effectRef idx="1">
+            <a:schemeClr val="accent4"/>
+          </a:effectRef>
+          <a:fontRef idx="minor">
+            <a:schemeClr val="dk1"/>
+          </a:fontRef>
+        </p:style>
+        <p:txBody>
+          <a:bodyPr rtlCol="0" anchor="ctr"/>
+          <a:lstStyle/>
+          <a:p>
+            <a:pPr algn="ctr"/>
+            <a:endParaRPr lang="en-SG" sz="1050" b="1">
+              <a:solidFill>
+                <a:srgbClr val="92D050"/>
+              </a:solidFill>
+            </a:endParaRPr>
+          </a:p>
+        </p:txBody>
+      </p:sp>
+      <p:cxnSp>
+        <p:nvCxnSpPr>
+          <p:cNvPr id="146" name="Elbow Connector 63">
+            <a:extLst>
+              <a:ext uri="{FF2B5EF4-FFF2-40B4-BE49-F238E27FC236}">
+                <a16:creationId xmlns:a16="http://schemas.microsoft.com/office/drawing/2014/main" id="{569BC528-42BF-4D43-9C08-CC7DF00A7994}"/>
+              </a:ext>
+            </a:extLst>
+          </p:cNvPr>
+          <p:cNvCxnSpPr>
+            <a:cxnSpLocks/>
+            <a:endCxn id="143" idx="3"/>
+          </p:cNvCxnSpPr>
+          <p:nvPr/>
+        </p:nvCxnSpPr>
+        <p:spPr>
+          <a:xfrm rot="16200000" flipH="1">
+            <a:off x="6116935" y="3512731"/>
+            <a:ext cx="525820" cy="105792"/>
+          </a:xfrm>
+          <a:prstGeom prst="bentConnector3">
+            <a:avLst>
+              <a:gd name="adj1" fmla="val 50000"/>
+            </a:avLst>
+          </a:prstGeom>
+          <a:ln w="19050">
+            <a:solidFill>
+              <a:srgbClr val="7030A0"/>
+            </a:solidFill>
+            <a:prstDash val="sysDot"/>
+            <a:headEnd type="none" w="med" len="med"/>
+            <a:tailEnd type="none" w="med" len="med"/>
+          </a:ln>
+          <a:effectLst/>
+        </p:spPr>
+        <p:style>
+          <a:lnRef idx="1">
+            <a:schemeClr val="accent2"/>
+          </a:lnRef>
+          <a:fillRef idx="2">
+            <a:schemeClr val="accent2"/>
+          </a:fillRef>
+          <a:effectRef idx="1">
+            <a:schemeClr val="accent2"/>
+          </a:effectRef>
+          <a:fontRef idx="minor">
+            <a:schemeClr val="dk1"/>
+          </a:fontRef>
+        </p:style>
+      </p:cxnSp>
     </p:spTree>
     <p:extLst>
       <p:ext uri="{BB962C8B-B14F-4D97-AF65-F5344CB8AC3E}">
@@ -5926,13 +7539,6 @@
   <p:clrMapOvr>
     <a:masterClrMapping/>
   </p:clrMapOvr>
-  <p:timing>
-    <p:tnLst>
-      <p:par>
-        <p:cTn id="1" dur="indefinite" restart="never" nodeType="tmRoot"/>
-      </p:par>
-    </p:tnLst>
-  </p:timing>
 </p:sld>
 </file>
 

</xml_diff>